<commit_message>
Cuaderno de estudio MA_09_11_CO
Cuaderno de estudio, guia, mapa conceptual y formulas actualizadas con
corrreccion de estilo
</commit_message>
<xml_diff>
--- a/fuentes/contenidos/grado09/guion11/mapa tema 11.pptx
+++ b/fuentes/contenidos/grado09/guion11/mapa tema 11.pptx
@@ -406,7 +406,7 @@
             <a:fld id="{5001C876-01F7-4317-94B9-1AE222133113}" type="datetimeFigureOut">
               <a:rPr lang="es-ES" smtClean="0"/>
               <a:pPr/>
-              <a:t>30/01/2016</a:t>
+              <a:t>30/03/2016</a:t>
             </a:fld>
             <a:endParaRPr lang="es-ES"/>
           </a:p>
@@ -995,7 +995,16 @@
                 </a:solidFill>
                 <a:cs typeface="Arial" pitchFamily="34" charset="0"/>
               </a:rPr>
-              <a:t>Cuerpos geométricos   </a:t>
+              <a:t>Los cuerpos </a:t>
+            </a:r>
+            <a:r>
+              <a:rPr lang="es-CO" sz="1900" b="1" dirty="0" smtClean="0">
+                <a:solidFill>
+                  <a:schemeClr val="tx1"/>
+                </a:solidFill>
+                <a:cs typeface="Arial" pitchFamily="34" charset="0"/>
+              </a:rPr>
+              <a:t>geométricos   </a:t>
             </a:r>
             <a:endParaRPr lang="es-CO" sz="1900" b="1" dirty="0">
               <a:solidFill>
@@ -1044,13 +1053,22 @@
           <a:p>
             <a:pPr algn="ctr"/>
             <a:r>
+              <a:rPr lang="es-CO" sz="1400" b="1" dirty="0">
+                <a:solidFill>
+                  <a:schemeClr val="tx1"/>
+                </a:solidFill>
+                <a:cs typeface="Arial" pitchFamily="34" charset="0"/>
+              </a:rPr>
+              <a:t>T</a:t>
+            </a:r>
+            <a:r>
               <a:rPr lang="es-CO" sz="1400" b="1" dirty="0" smtClean="0">
                 <a:solidFill>
                   <a:schemeClr val="tx1"/>
                 </a:solidFill>
                 <a:cs typeface="Arial" pitchFamily="34" charset="0"/>
               </a:rPr>
-              <a:t>Figuras geométricas con 3 dimensiones      </a:t>
+              <a:t>ridimensionales</a:t>
             </a:r>
             <a:endParaRPr lang="es-CO" sz="1400" b="1" dirty="0">
               <a:solidFill>
@@ -1170,7 +1188,15 @@
                   <a:schemeClr val="bg1"/>
                 </a:solidFill>
               </a:rPr>
-              <a:t>Cuerpos redondos </a:t>
+              <a:t>Cuerpos </a:t>
+            </a:r>
+            <a:r>
+              <a:rPr lang="es-ES_tradnl" sz="1050" dirty="0" smtClean="0">
+                <a:solidFill>
+                  <a:schemeClr val="bg1"/>
+                </a:solidFill>
+              </a:rPr>
+              <a:t>redondos </a:t>
             </a:r>
             <a:endParaRPr lang="es-CO" sz="1050" i="1" dirty="0">
               <a:solidFill>
@@ -1356,31 +1382,13 @@
           <a:p>
             <a:pPr algn="ctr"/>
             <a:r>
-              <a:rPr lang="es-CO" sz="900" dirty="0">
-                <a:solidFill>
-                  <a:schemeClr val="tx1"/>
-                </a:solidFill>
-                <a:cs typeface="Arial" pitchFamily="34" charset="0"/>
-              </a:rPr>
-              <a:t>q</a:t>
-            </a:r>
-            <a:r>
-              <a:rPr lang="es-CO" sz="900" dirty="0" smtClean="0">
-                <a:solidFill>
-                  <a:schemeClr val="tx1"/>
-                </a:solidFill>
-                <a:cs typeface="Arial" pitchFamily="34" charset="0"/>
-              </a:rPr>
-              <a:t>ue es </a:t>
-            </a:r>
-            <a:r>
-              <a:rPr lang="es-CO" sz="900" dirty="0" smtClean="0">
-                <a:solidFill>
-                  <a:schemeClr val="tx1"/>
-                </a:solidFill>
-                <a:cs typeface="Arial" pitchFamily="34" charset="0"/>
-              </a:rPr>
-              <a:t>   </a:t>
+              <a:rPr lang="es-CO" sz="900" dirty="0" smtClean="0">
+                <a:solidFill>
+                  <a:schemeClr val="tx1"/>
+                </a:solidFill>
+                <a:cs typeface="Arial" pitchFamily="34" charset="0"/>
+              </a:rPr>
+              <a:t>se define como</a:t>
             </a:r>
             <a:endParaRPr lang="es-CO" sz="900" dirty="0">
               <a:solidFill>
@@ -1507,22 +1515,22 @@
           <a:p>
             <a:pPr algn="ctr"/>
             <a:r>
-              <a:rPr lang="es-CO" sz="900" dirty="0">
-                <a:solidFill>
-                  <a:schemeClr val="tx1"/>
-                </a:solidFill>
-                <a:cs typeface="Arial" pitchFamily="34" charset="0"/>
-              </a:rPr>
-              <a:t>a</a:t>
-            </a:r>
-            <a:r>
-              <a:rPr lang="es-CO" sz="900" dirty="0" smtClean="0">
-                <a:solidFill>
-                  <a:schemeClr val="tx1"/>
-                </a:solidFill>
-                <a:cs typeface="Arial" pitchFamily="34" charset="0"/>
-              </a:rPr>
-              <a:t>lmenas una de sus caras es de forma curva  </a:t>
+              <a:rPr lang="es-CO" sz="900" dirty="0" smtClean="0">
+                <a:solidFill>
+                  <a:schemeClr val="tx1"/>
+                </a:solidFill>
+                <a:cs typeface="Arial" pitchFamily="34" charset="0"/>
+              </a:rPr>
+              <a:t>Al menos </a:t>
+            </a:r>
+            <a:r>
+              <a:rPr lang="es-CO" sz="900" dirty="0" smtClean="0">
+                <a:solidFill>
+                  <a:schemeClr val="tx1"/>
+                </a:solidFill>
+                <a:cs typeface="Arial" pitchFamily="34" charset="0"/>
+              </a:rPr>
+              <a:t>una de sus caras es de forma curva  </a:t>
             </a:r>
             <a:endParaRPr lang="es-CO" sz="900" b="1" dirty="0">
               <a:solidFill>
@@ -1679,7 +1687,16 @@
                 </a:solidFill>
                 <a:cs typeface="Arial" pitchFamily="34" charset="0"/>
               </a:rPr>
-              <a:t> ejemplos   </a:t>
+              <a:t> </a:t>
+            </a:r>
+            <a:r>
+              <a:rPr lang="es-CO" sz="900" dirty="0" smtClean="0">
+                <a:solidFill>
+                  <a:schemeClr val="tx1"/>
+                </a:solidFill>
+                <a:cs typeface="Arial" pitchFamily="34" charset="0"/>
+              </a:rPr>
+              <a:t>se destacan   </a:t>
             </a:r>
             <a:endParaRPr lang="es-CO" sz="900" dirty="0">
               <a:solidFill>
@@ -1833,13 +1850,31 @@
           <a:p>
             <a:pPr algn="ctr"/>
             <a:r>
-              <a:rPr lang="es-CO" sz="900" dirty="0" smtClean="0">
-                <a:solidFill>
-                  <a:schemeClr val="tx1"/>
-                </a:solidFill>
-                <a:cs typeface="Arial" pitchFamily="34" charset="0"/>
-              </a:rPr>
-              <a:t>Delimitado por  2 circunferencias congruentes y una superficie curva  cerrada  </a:t>
+              <a:rPr lang="es-CO" sz="900" dirty="0">
+                <a:solidFill>
+                  <a:schemeClr val="tx1"/>
+                </a:solidFill>
+                <a:cs typeface="Arial" pitchFamily="34" charset="0"/>
+              </a:rPr>
+              <a:t>d</a:t>
+            </a:r>
+            <a:r>
+              <a:rPr lang="es-CO" sz="900" dirty="0" smtClean="0">
+                <a:solidFill>
+                  <a:schemeClr val="tx1"/>
+                </a:solidFill>
+                <a:cs typeface="Arial" pitchFamily="34" charset="0"/>
+              </a:rPr>
+              <a:t>elimitado </a:t>
+            </a:r>
+            <a:r>
+              <a:rPr lang="es-CO" sz="900" dirty="0" smtClean="0">
+                <a:solidFill>
+                  <a:schemeClr val="tx1"/>
+                </a:solidFill>
+                <a:cs typeface="Arial" pitchFamily="34" charset="0"/>
+              </a:rPr>
+              <a:t>por  2 circunferencias congruentes y una superficie curva  cerrada  </a:t>
             </a:r>
           </a:p>
         </p:txBody>
@@ -1882,146 +1917,6 @@
           </a:fontRef>
         </p:style>
       </p:cxnSp>
-      <p:cxnSp>
-        <p:nvCxnSpPr>
-          <p:cNvPr id="248" name="247 Conector recto"/>
-          <p:cNvCxnSpPr>
-            <a:stCxn id="252" idx="2"/>
-            <a:endCxn id="384" idx="0"/>
-          </p:cNvCxnSpPr>
-          <p:nvPr/>
-        </p:nvCxnSpPr>
-        <p:spPr>
-          <a:xfrm flipH="1">
-            <a:off x="607068" y="8323577"/>
-            <a:ext cx="3" cy="136218"/>
-          </a:xfrm>
-          <a:prstGeom prst="line">
-            <a:avLst/>
-          </a:prstGeom>
-          <a:ln w="12700">
-            <a:solidFill>
-              <a:schemeClr val="tx1"/>
-            </a:solidFill>
-          </a:ln>
-        </p:spPr>
-        <p:style>
-          <a:lnRef idx="1">
-            <a:schemeClr val="accent1"/>
-          </a:lnRef>
-          <a:fillRef idx="0">
-            <a:schemeClr val="accent1"/>
-          </a:fillRef>
-          <a:effectRef idx="0">
-            <a:schemeClr val="accent1"/>
-          </a:effectRef>
-          <a:fontRef idx="minor">
-            <a:schemeClr val="tx1"/>
-          </a:fontRef>
-        </p:style>
-      </p:cxnSp>
-      <p:sp>
-        <p:nvSpPr>
-          <p:cNvPr id="252" name="Rectángulo 35"/>
-          <p:cNvSpPr/>
-          <p:nvPr/>
-        </p:nvSpPr>
-        <p:spPr>
-          <a:xfrm>
-            <a:off x="166392" y="8092894"/>
-            <a:ext cx="881358" cy="230683"/>
-          </a:xfrm>
-          <a:prstGeom prst="rect">
-            <a:avLst/>
-          </a:prstGeom>
-          <a:ln>
-            <a:noFill/>
-          </a:ln>
-        </p:spPr>
-        <p:style>
-          <a:lnRef idx="2">
-            <a:schemeClr val="dk1"/>
-          </a:lnRef>
-          <a:fillRef idx="1">
-            <a:schemeClr val="lt1"/>
-          </a:fillRef>
-          <a:effectRef idx="0">
-            <a:schemeClr val="dk1"/>
-          </a:effectRef>
-          <a:fontRef idx="minor">
-            <a:schemeClr val="dk1"/>
-          </a:fontRef>
-        </p:style>
-        <p:txBody>
-          <a:bodyPr lIns="105683" tIns="52841" rIns="105683" bIns="52841" rtlCol="0" anchor="ctr"/>
-          <a:lstStyle/>
-          <a:p>
-            <a:pPr algn="ctr"/>
-            <a:r>
-              <a:rPr lang="es-CO" sz="900" dirty="0">
-                <a:solidFill>
-                  <a:schemeClr val="tx1"/>
-                </a:solidFill>
-                <a:cs typeface="Arial" pitchFamily="34" charset="0"/>
-              </a:rPr>
-              <a:t>e</a:t>
-            </a:r>
-            <a:r>
-              <a:rPr lang="es-CO" sz="900" dirty="0" smtClean="0">
-                <a:solidFill>
-                  <a:schemeClr val="tx1"/>
-                </a:solidFill>
-                <a:cs typeface="Arial" pitchFamily="34" charset="0"/>
-              </a:rPr>
-              <a:t>jemplo      </a:t>
-            </a:r>
-            <a:endParaRPr lang="es-CO" sz="900" dirty="0">
-              <a:solidFill>
-                <a:schemeClr val="tx1"/>
-              </a:solidFill>
-              <a:cs typeface="Arial" pitchFamily="34" charset="0"/>
-            </a:endParaRPr>
-          </a:p>
-        </p:txBody>
-      </p:sp>
-      <p:cxnSp>
-        <p:nvCxnSpPr>
-          <p:cNvPr id="115" name="114 Conector recto"/>
-          <p:cNvCxnSpPr>
-            <a:stCxn id="243" idx="2"/>
-            <a:endCxn id="252" idx="0"/>
-          </p:cNvCxnSpPr>
-          <p:nvPr/>
-        </p:nvCxnSpPr>
-        <p:spPr>
-          <a:xfrm flipH="1">
-            <a:off x="607071" y="7966067"/>
-            <a:ext cx="4590" cy="126827"/>
-          </a:xfrm>
-          <a:prstGeom prst="line">
-            <a:avLst/>
-          </a:prstGeom>
-          <a:ln w="12700">
-            <a:solidFill>
-              <a:schemeClr val="tx1"/>
-            </a:solidFill>
-          </a:ln>
-        </p:spPr>
-        <p:style>
-          <a:lnRef idx="1">
-            <a:schemeClr val="accent1"/>
-          </a:lnRef>
-          <a:fillRef idx="0">
-            <a:schemeClr val="accent1"/>
-          </a:fillRef>
-          <a:effectRef idx="0">
-            <a:schemeClr val="accent1"/>
-          </a:effectRef>
-          <a:fontRef idx="minor">
-            <a:schemeClr val="tx1"/>
-          </a:fontRef>
-        </p:style>
-      </p:cxnSp>
       <p:sp>
         <p:nvSpPr>
           <p:cNvPr id="135" name="Rectángulo 33"/>
@@ -2126,13 +2021,31 @@
           <a:p>
             <a:pPr algn="ctr"/>
             <a:r>
-              <a:rPr lang="es-CO" sz="900" dirty="0" smtClean="0">
-                <a:solidFill>
-                  <a:schemeClr val="tx1"/>
-                </a:solidFill>
-                <a:cs typeface="Arial" pitchFamily="34" charset="0"/>
-              </a:rPr>
-              <a:t>Por medio de las  </a:t>
+              <a:rPr lang="es-CO" sz="900" dirty="0">
+                <a:solidFill>
+                  <a:schemeClr val="tx1"/>
+                </a:solidFill>
+                <a:cs typeface="Arial" pitchFamily="34" charset="0"/>
+              </a:rPr>
+              <a:t>p</a:t>
+            </a:r>
+            <a:r>
+              <a:rPr lang="es-CO" sz="900" dirty="0" smtClean="0">
+                <a:solidFill>
+                  <a:schemeClr val="tx1"/>
+                </a:solidFill>
+                <a:cs typeface="Arial" pitchFamily="34" charset="0"/>
+              </a:rPr>
+              <a:t>or </a:t>
+            </a:r>
+            <a:r>
+              <a:rPr lang="es-CO" sz="900" dirty="0" smtClean="0">
+                <a:solidFill>
+                  <a:schemeClr val="tx1"/>
+                </a:solidFill>
+                <a:cs typeface="Arial" pitchFamily="34" charset="0"/>
+              </a:rPr>
+              <a:t>medio de las  </a:t>
             </a:r>
             <a:endParaRPr lang="es-CO" sz="900" dirty="0">
               <a:solidFill>
@@ -2291,16 +2204,7 @@
                 </a:solidFill>
                 <a:cs typeface="Arial" pitchFamily="34" charset="0"/>
               </a:rPr>
-              <a:t>ntendidas como </a:t>
-            </a:r>
-            <a:r>
-              <a:rPr lang="es-CO" sz="900" dirty="0" smtClean="0">
-                <a:solidFill>
-                  <a:schemeClr val="tx1"/>
-                </a:solidFill>
-                <a:cs typeface="Arial" pitchFamily="34" charset="0"/>
-              </a:rPr>
-              <a:t>    </a:t>
+              <a:t>ntendidas como     </a:t>
             </a:r>
             <a:endParaRPr lang="es-CO" sz="900" dirty="0">
               <a:solidFill>
@@ -2353,7 +2257,15 @@
             </a:r>
             <a:r>
               <a:rPr lang="es-ES_tradnl" sz="900" dirty="0"/>
-              <a:t>técnicas que permite representar la superficie </a:t>
+              <a:t>técnicas que </a:t>
+            </a:r>
+            <a:r>
+              <a:rPr lang="es-ES_tradnl" sz="900" dirty="0" smtClean="0"/>
+              <a:t>permiten </a:t>
+            </a:r>
+            <a:r>
+              <a:rPr lang="es-ES_tradnl" sz="900" dirty="0"/>
+              <a:t>representar la superficie </a:t>
             </a:r>
             <a:r>
               <a:rPr lang="es-ES_tradnl" sz="900" dirty="0" smtClean="0"/>
@@ -2365,11 +2277,7 @@
             </a:r>
             <a:r>
               <a:rPr lang="es-ES_tradnl" sz="900" dirty="0" smtClean="0"/>
-              <a:t>tierra o parte de ella en  mapas </a:t>
-            </a:r>
-            <a:r>
-              <a:rPr lang="es-ES_tradnl" sz="900" dirty="0" smtClean="0"/>
-              <a:t>.</a:t>
+              <a:t>tierra o parte de ella en  mapas .</a:t>
             </a:r>
             <a:endParaRPr lang="es-CO" sz="900" dirty="0">
               <a:solidFill>
@@ -2683,25 +2591,7 @@
                 </a:solidFill>
                 <a:cs typeface="Arial" pitchFamily="34" charset="0"/>
               </a:rPr>
-              <a:t>Se clasifican </a:t>
-            </a:r>
-            <a:endParaRPr lang="es-CO" sz="900" dirty="0" smtClean="0">
-              <a:solidFill>
-                <a:schemeClr val="tx1"/>
-              </a:solidFill>
-              <a:cs typeface="Arial" pitchFamily="34" charset="0"/>
-            </a:endParaRPr>
-          </a:p>
-          <a:p>
-            <a:pPr algn="ctr"/>
-            <a:r>
-              <a:rPr lang="es-CO" sz="900" dirty="0" smtClean="0">
-                <a:solidFill>
-                  <a:schemeClr val="tx1"/>
-                </a:solidFill>
-                <a:cs typeface="Arial" pitchFamily="34" charset="0"/>
-              </a:rPr>
-              <a:t>en  </a:t>
+              <a:t>Estas técnicas son</a:t>
             </a:r>
             <a:endParaRPr lang="es-CO" sz="900" dirty="0" smtClean="0">
               <a:solidFill>
@@ -3016,7 +2906,16 @@
                 </a:solidFill>
                 <a:cs typeface="Arial" pitchFamily="34" charset="0"/>
               </a:rPr>
-              <a:t>e dividen en     </a:t>
+              <a:t>e </a:t>
+            </a:r>
+            <a:r>
+              <a:rPr lang="es-CO" sz="900" dirty="0" smtClean="0">
+                <a:solidFill>
+                  <a:schemeClr val="tx1"/>
+                </a:solidFill>
+                <a:cs typeface="Arial" pitchFamily="34" charset="0"/>
+              </a:rPr>
+              <a:t>clasifican en     </a:t>
             </a:r>
             <a:endParaRPr lang="es-CO" sz="900" dirty="0">
               <a:solidFill>
@@ -3161,12 +3060,28 @@
           <a:p>
             <a:pPr algn="ctr"/>
             <a:r>
+              <a:rPr lang="es-ES_tradnl" sz="1050" dirty="0">
+                <a:solidFill>
+                  <a:schemeClr val="bg1"/>
+                </a:solidFill>
+              </a:rPr>
+              <a:t>o</a:t>
+            </a:r>
+            <a:r>
               <a:rPr lang="es-ES_tradnl" sz="1050" dirty="0" smtClean="0">
                 <a:solidFill>
                   <a:schemeClr val="bg1"/>
                 </a:solidFill>
               </a:rPr>
-              <a:t>Otros cuerpos geométricos  </a:t>
+              <a:t>tros </a:t>
+            </a:r>
+            <a:r>
+              <a:rPr lang="es-ES_tradnl" sz="1050" dirty="0" smtClean="0">
+                <a:solidFill>
+                  <a:schemeClr val="bg1"/>
+                </a:solidFill>
+              </a:rPr>
+              <a:t>cuerpos geométricos  </a:t>
             </a:r>
             <a:endParaRPr lang="es-CO" sz="1050" i="1" dirty="0">
               <a:solidFill>
@@ -3295,13 +3210,49 @@
           <a:p>
             <a:pPr algn="ctr"/>
             <a:r>
-              <a:rPr lang="es-CO" sz="900" dirty="0" smtClean="0">
-                <a:solidFill>
-                  <a:schemeClr val="tx1"/>
-                </a:solidFill>
-                <a:cs typeface="Arial" pitchFamily="34" charset="0"/>
-              </a:rPr>
-              <a:t>Son aquellos donde      </a:t>
+              <a:rPr lang="es-CO" sz="900" dirty="0">
+                <a:solidFill>
+                  <a:schemeClr val="tx1"/>
+                </a:solidFill>
+                <a:cs typeface="Arial" pitchFamily="34" charset="0"/>
+              </a:rPr>
+              <a:t>s</a:t>
+            </a:r>
+            <a:r>
+              <a:rPr lang="es-CO" sz="900" dirty="0" smtClean="0">
+                <a:solidFill>
+                  <a:schemeClr val="tx1"/>
+                </a:solidFill>
+                <a:cs typeface="Arial" pitchFamily="34" charset="0"/>
+              </a:rPr>
+              <a:t>on </a:t>
+            </a:r>
+            <a:r>
+              <a:rPr lang="es-CO" sz="900" dirty="0" smtClean="0">
+                <a:solidFill>
+                  <a:schemeClr val="tx1"/>
+                </a:solidFill>
+                <a:cs typeface="Arial" pitchFamily="34" charset="0"/>
+              </a:rPr>
+              <a:t>aquellos </a:t>
+            </a:r>
+            <a:r>
+              <a:rPr lang="es-CO" sz="900" dirty="0" smtClean="0">
+                <a:solidFill>
+                  <a:schemeClr val="tx1"/>
+                </a:solidFill>
+                <a:cs typeface="Arial" pitchFamily="34" charset="0"/>
+              </a:rPr>
+              <a:t>que</a:t>
+            </a:r>
+            <a:r>
+              <a:rPr lang="es-CO" sz="900" dirty="0" smtClean="0">
+                <a:solidFill>
+                  <a:schemeClr val="tx1"/>
+                </a:solidFill>
+                <a:cs typeface="Arial" pitchFamily="34" charset="0"/>
+              </a:rPr>
+              <a:t>     </a:t>
             </a:r>
             <a:endParaRPr lang="es-CO" sz="900" dirty="0">
               <a:solidFill>
@@ -3557,13 +3508,49 @@
           <a:p>
             <a:pPr algn="ctr"/>
             <a:r>
-              <a:rPr lang="es-CO" sz="900" dirty="0" smtClean="0">
-                <a:solidFill>
-                  <a:schemeClr val="tx1"/>
-                </a:solidFill>
-                <a:cs typeface="Arial" pitchFamily="34" charset="0"/>
-              </a:rPr>
-              <a:t>Son aquellos donde      </a:t>
+              <a:rPr lang="es-CO" sz="900" dirty="0">
+                <a:solidFill>
+                  <a:schemeClr val="tx1"/>
+                </a:solidFill>
+                <a:cs typeface="Arial" pitchFamily="34" charset="0"/>
+              </a:rPr>
+              <a:t>s</a:t>
+            </a:r>
+            <a:r>
+              <a:rPr lang="es-CO" sz="900" dirty="0" smtClean="0">
+                <a:solidFill>
+                  <a:schemeClr val="tx1"/>
+                </a:solidFill>
+                <a:cs typeface="Arial" pitchFamily="34" charset="0"/>
+              </a:rPr>
+              <a:t>on </a:t>
+            </a:r>
+            <a:r>
+              <a:rPr lang="es-CO" sz="900" dirty="0" smtClean="0">
+                <a:solidFill>
+                  <a:schemeClr val="tx1"/>
+                </a:solidFill>
+                <a:cs typeface="Arial" pitchFamily="34" charset="0"/>
+              </a:rPr>
+              <a:t>aquellos </a:t>
+            </a:r>
+            <a:r>
+              <a:rPr lang="es-CO" sz="900" dirty="0" smtClean="0">
+                <a:solidFill>
+                  <a:schemeClr val="tx1"/>
+                </a:solidFill>
+                <a:cs typeface="Arial" pitchFamily="34" charset="0"/>
+              </a:rPr>
+              <a:t>que</a:t>
+            </a:r>
+            <a:r>
+              <a:rPr lang="es-CO" sz="900" dirty="0" smtClean="0">
+                <a:solidFill>
+                  <a:schemeClr val="tx1"/>
+                </a:solidFill>
+                <a:cs typeface="Arial" pitchFamily="34" charset="0"/>
+              </a:rPr>
+              <a:t>      </a:t>
             </a:r>
             <a:endParaRPr lang="es-CO" sz="900" dirty="0">
               <a:solidFill>
@@ -3850,7 +3837,7 @@
                   <a:schemeClr val="tx1"/>
                 </a:solidFill>
               </a:rPr>
-              <a:t>e</a:t>
+              <a:t>E</a:t>
             </a:r>
             <a:r>
               <a:rPr lang="es-ES" sz="900" dirty="0" smtClean="0">
@@ -3860,6 +3847,11 @@
               </a:rPr>
               <a:t>sfera   </a:t>
             </a:r>
+            <a:endParaRPr lang="es-ES" sz="900" dirty="0" smtClean="0">
+              <a:solidFill>
+                <a:schemeClr val="tx1"/>
+              </a:solidFill>
+            </a:endParaRPr>
           </a:p>
           <a:p>
             <a:pPr algn="ctr"/>
@@ -4005,8 +3997,13 @@
                   <a:schemeClr val="tx1"/>
                 </a:solidFill>
               </a:rPr>
-              <a:t>Prismas   </a:t>
-            </a:r>
+              <a:t>Prisma   </a:t>
+            </a:r>
+            <a:endParaRPr lang="es-ES" sz="900" dirty="0" smtClean="0">
+              <a:solidFill>
+                <a:schemeClr val="tx1"/>
+              </a:solidFill>
+            </a:endParaRPr>
           </a:p>
           <a:p>
             <a:pPr algn="ctr"/>
@@ -4170,7 +4167,16 @@
                 </a:solidFill>
                 <a:cs typeface="Arial" pitchFamily="34" charset="0"/>
               </a:rPr>
-              <a:t> ejemplos   </a:t>
+              <a:t> </a:t>
+            </a:r>
+            <a:r>
+              <a:rPr lang="es-CO" sz="900" dirty="0" smtClean="0">
+                <a:solidFill>
+                  <a:schemeClr val="tx1"/>
+                </a:solidFill>
+                <a:cs typeface="Arial" pitchFamily="34" charset="0"/>
+              </a:rPr>
+              <a:t>se destacan</a:t>
             </a:r>
             <a:endParaRPr lang="es-CO" sz="900" dirty="0">
               <a:solidFill>
@@ -4303,7 +4309,16 @@
                 </a:solidFill>
                 <a:cs typeface="Arial" pitchFamily="34" charset="0"/>
               </a:rPr>
-              <a:t> ejemplos   </a:t>
+              <a:t> </a:t>
+            </a:r>
+            <a:r>
+              <a:rPr lang="es-CO" sz="900" dirty="0" smtClean="0">
+                <a:solidFill>
+                  <a:schemeClr val="tx1"/>
+                </a:solidFill>
+                <a:cs typeface="Arial" pitchFamily="34" charset="0"/>
+              </a:rPr>
+              <a:t>se destacan</a:t>
             </a:r>
             <a:endParaRPr lang="es-CO" sz="900" dirty="0">
               <a:solidFill>
@@ -4400,12 +4415,28 @@
           <a:p>
             <a:pPr algn="ctr"/>
             <a:r>
+              <a:rPr lang="es-ES" sz="900" dirty="0">
+                <a:solidFill>
+                  <a:schemeClr val="tx1"/>
+                </a:solidFill>
+              </a:rPr>
+              <a:t>t</a:t>
+            </a:r>
+            <a:r>
               <a:rPr lang="es-ES" sz="900" dirty="0" smtClean="0">
                 <a:solidFill>
                   <a:schemeClr val="tx1"/>
                 </a:solidFill>
               </a:rPr>
-              <a:t>Tronco de cono  </a:t>
+              <a:t>ronco </a:t>
+            </a:r>
+            <a:r>
+              <a:rPr lang="es-ES" sz="900" dirty="0" smtClean="0">
+                <a:solidFill>
+                  <a:schemeClr val="tx1"/>
+                </a:solidFill>
+              </a:rPr>
+              <a:t>de cono  </a:t>
             </a:r>
           </a:p>
           <a:p>
@@ -4764,13 +4795,49 @@
           <a:p>
             <a:pPr algn="ctr"/>
             <a:r>
-              <a:rPr lang="es-CO" sz="900" dirty="0" smtClean="0">
-                <a:solidFill>
-                  <a:schemeClr val="tx1"/>
-                </a:solidFill>
-                <a:cs typeface="Arial" pitchFamily="34" charset="0"/>
-              </a:rPr>
-              <a:t>Delimitado por  1 circunferencia , un punto  y una superficie curva  cerrada   </a:t>
+              <a:rPr lang="es-CO" sz="900" dirty="0">
+                <a:solidFill>
+                  <a:schemeClr val="tx1"/>
+                </a:solidFill>
+                <a:cs typeface="Arial" pitchFamily="34" charset="0"/>
+              </a:rPr>
+              <a:t>d</a:t>
+            </a:r>
+            <a:r>
+              <a:rPr lang="es-CO" sz="900" dirty="0" smtClean="0">
+                <a:solidFill>
+                  <a:schemeClr val="tx1"/>
+                </a:solidFill>
+                <a:cs typeface="Arial" pitchFamily="34" charset="0"/>
+              </a:rPr>
+              <a:t>elimitado </a:t>
+            </a:r>
+            <a:r>
+              <a:rPr lang="es-CO" sz="900" dirty="0" smtClean="0">
+                <a:solidFill>
+                  <a:schemeClr val="tx1"/>
+                </a:solidFill>
+                <a:cs typeface="Arial" pitchFamily="34" charset="0"/>
+              </a:rPr>
+              <a:t>por </a:t>
+            </a:r>
+            <a:r>
+              <a:rPr lang="es-CO" sz="900" dirty="0" smtClean="0">
+                <a:solidFill>
+                  <a:schemeClr val="tx1"/>
+                </a:solidFill>
+                <a:cs typeface="Arial" pitchFamily="34" charset="0"/>
+              </a:rPr>
+              <a:t>una circunferencia, </a:t>
+            </a:r>
+            <a:r>
+              <a:rPr lang="es-CO" sz="900" dirty="0" smtClean="0">
+                <a:solidFill>
+                  <a:schemeClr val="tx1"/>
+                </a:solidFill>
+                <a:cs typeface="Arial" pitchFamily="34" charset="0"/>
+              </a:rPr>
+              <a:t>un punto  y una superficie curva  cerrada   </a:t>
             </a:r>
           </a:p>
         </p:txBody>
@@ -4988,13 +5055,49 @@
           <a:p>
             <a:pPr algn="ctr"/>
             <a:r>
-              <a:rPr lang="es-CO" sz="900" dirty="0" smtClean="0">
-                <a:solidFill>
-                  <a:schemeClr val="tx1"/>
-                </a:solidFill>
-                <a:cs typeface="Arial" pitchFamily="34" charset="0"/>
-              </a:rPr>
-              <a:t>Delimitado  por  una superficie curva que equidista  de un punto central  </a:t>
+              <a:rPr lang="es-CO" sz="900" dirty="0">
+                <a:solidFill>
+                  <a:schemeClr val="tx1"/>
+                </a:solidFill>
+                <a:cs typeface="Arial" pitchFamily="34" charset="0"/>
+              </a:rPr>
+              <a:t>d</a:t>
+            </a:r>
+            <a:r>
+              <a:rPr lang="es-CO" sz="900" dirty="0" smtClean="0">
+                <a:solidFill>
+                  <a:schemeClr val="tx1"/>
+                </a:solidFill>
+                <a:cs typeface="Arial" pitchFamily="34" charset="0"/>
+              </a:rPr>
+              <a:t>elimitado  </a:t>
+            </a:r>
+            <a:r>
+              <a:rPr lang="es-CO" sz="900" dirty="0" smtClean="0">
+                <a:solidFill>
+                  <a:schemeClr val="tx1"/>
+                </a:solidFill>
+                <a:cs typeface="Arial" pitchFamily="34" charset="0"/>
+              </a:rPr>
+              <a:t>por  una superficie curva que equidista </a:t>
+            </a:r>
+            <a:r>
+              <a:rPr lang="es-CO" sz="900" dirty="0" smtClean="0">
+                <a:solidFill>
+                  <a:schemeClr val="tx1"/>
+                </a:solidFill>
+                <a:cs typeface="Arial" pitchFamily="34" charset="0"/>
+              </a:rPr>
+              <a:t>de </a:t>
+            </a:r>
+            <a:r>
+              <a:rPr lang="es-CO" sz="900" dirty="0" smtClean="0">
+                <a:solidFill>
+                  <a:schemeClr val="tx1"/>
+                </a:solidFill>
+                <a:cs typeface="Arial" pitchFamily="34" charset="0"/>
+              </a:rPr>
+              <a:t>un punto central  </a:t>
             </a:r>
           </a:p>
         </p:txBody>
@@ -5037,339 +5140,6 @@
           </a:fontRef>
         </p:style>
       </p:cxnSp>
-      <p:sp>
-        <p:nvSpPr>
-          <p:cNvPr id="377" name="Rectángulo 35"/>
-          <p:cNvSpPr/>
-          <p:nvPr/>
-        </p:nvSpPr>
-        <p:spPr>
-          <a:xfrm>
-            <a:off x="1347492" y="8103885"/>
-            <a:ext cx="881358" cy="229218"/>
-          </a:xfrm>
-          <a:prstGeom prst="rect">
-            <a:avLst/>
-          </a:prstGeom>
-          <a:ln>
-            <a:noFill/>
-          </a:ln>
-        </p:spPr>
-        <p:style>
-          <a:lnRef idx="2">
-            <a:schemeClr val="dk1"/>
-          </a:lnRef>
-          <a:fillRef idx="1">
-            <a:schemeClr val="lt1"/>
-          </a:fillRef>
-          <a:effectRef idx="0">
-            <a:schemeClr val="dk1"/>
-          </a:effectRef>
-          <a:fontRef idx="minor">
-            <a:schemeClr val="dk1"/>
-          </a:fontRef>
-        </p:style>
-        <p:txBody>
-          <a:bodyPr lIns="105683" tIns="52841" rIns="105683" bIns="52841" rtlCol="0" anchor="ctr"/>
-          <a:lstStyle/>
-          <a:p>
-            <a:pPr algn="ctr"/>
-            <a:r>
-              <a:rPr lang="es-CO" sz="900" dirty="0" smtClean="0">
-                <a:solidFill>
-                  <a:schemeClr val="tx1"/>
-                </a:solidFill>
-                <a:cs typeface="Arial" pitchFamily="34" charset="0"/>
-              </a:rPr>
-              <a:t>ejemplo     </a:t>
-            </a:r>
-            <a:endParaRPr lang="es-CO" sz="900" dirty="0">
-              <a:solidFill>
-                <a:schemeClr val="tx1"/>
-              </a:solidFill>
-              <a:cs typeface="Arial" pitchFamily="34" charset="0"/>
-            </a:endParaRPr>
-          </a:p>
-        </p:txBody>
-      </p:sp>
-      <p:cxnSp>
-        <p:nvCxnSpPr>
-          <p:cNvPr id="379" name="378 Conector recto"/>
-          <p:cNvCxnSpPr>
-            <a:stCxn id="353" idx="2"/>
-            <a:endCxn id="377" idx="0"/>
-          </p:cNvCxnSpPr>
-          <p:nvPr/>
-        </p:nvCxnSpPr>
-        <p:spPr>
-          <a:xfrm flipH="1">
-            <a:off x="1788171" y="7956542"/>
-            <a:ext cx="4590" cy="147343"/>
-          </a:xfrm>
-          <a:prstGeom prst="line">
-            <a:avLst/>
-          </a:prstGeom>
-          <a:ln w="12700">
-            <a:solidFill>
-              <a:schemeClr val="tx1"/>
-            </a:solidFill>
-          </a:ln>
-        </p:spPr>
-        <p:style>
-          <a:lnRef idx="1">
-            <a:schemeClr val="accent1"/>
-          </a:lnRef>
-          <a:fillRef idx="0">
-            <a:schemeClr val="accent1"/>
-          </a:fillRef>
-          <a:effectRef idx="0">
-            <a:schemeClr val="accent1"/>
-          </a:effectRef>
-          <a:fontRef idx="minor">
-            <a:schemeClr val="tx1"/>
-          </a:fontRef>
-        </p:style>
-      </p:cxnSp>
-      <p:sp>
-        <p:nvSpPr>
-          <p:cNvPr id="384" name="Rectángulo 33"/>
-          <p:cNvSpPr/>
-          <p:nvPr/>
-        </p:nvSpPr>
-        <p:spPr>
-          <a:xfrm>
-            <a:off x="47625" y="8459795"/>
-            <a:ext cx="1118885" cy="1174823"/>
-          </a:xfrm>
-          <a:prstGeom prst="rect">
-            <a:avLst/>
-          </a:prstGeom>
-          <a:solidFill>
-            <a:schemeClr val="bg1"/>
-          </a:solidFill>
-        </p:spPr>
-        <p:style>
-          <a:lnRef idx="2">
-            <a:schemeClr val="dk1"/>
-          </a:lnRef>
-          <a:fillRef idx="1">
-            <a:schemeClr val="lt1"/>
-          </a:fillRef>
-          <a:effectRef idx="0">
-            <a:schemeClr val="dk1"/>
-          </a:effectRef>
-          <a:fontRef idx="minor">
-            <a:schemeClr val="dk1"/>
-          </a:fontRef>
-        </p:style>
-        <p:txBody>
-          <a:bodyPr lIns="105683" tIns="52841" rIns="105683" bIns="52841" rtlCol="0" anchor="ctr"/>
-          <a:lstStyle/>
-          <a:p>
-            <a:pPr algn="ctr"/>
-            <a:endParaRPr lang="es-CO" sz="900" baseline="-25000" dirty="0" smtClean="0">
-              <a:solidFill>
-                <a:schemeClr val="tx1"/>
-              </a:solidFill>
-              <a:cs typeface="Arial" pitchFamily="34" charset="0"/>
-            </a:endParaRPr>
-          </a:p>
-          <a:p>
-            <a:pPr algn="ctr"/>
-            <a:endParaRPr lang="es-CO" sz="900" baseline="-25000" dirty="0">
-              <a:solidFill>
-                <a:schemeClr val="tx1"/>
-              </a:solidFill>
-              <a:cs typeface="Arial" pitchFamily="34" charset="0"/>
-            </a:endParaRPr>
-          </a:p>
-          <a:p>
-            <a:pPr algn="ctr"/>
-            <a:endParaRPr lang="es-CO" sz="900" baseline="-25000" dirty="0" smtClean="0">
-              <a:solidFill>
-                <a:schemeClr val="tx1"/>
-              </a:solidFill>
-              <a:cs typeface="Arial" pitchFamily="34" charset="0"/>
-            </a:endParaRPr>
-          </a:p>
-          <a:p>
-            <a:pPr algn="ctr"/>
-            <a:endParaRPr lang="es-CO" sz="900" baseline="-25000" dirty="0">
-              <a:solidFill>
-                <a:schemeClr val="tx1"/>
-              </a:solidFill>
-              <a:cs typeface="Arial" pitchFamily="34" charset="0"/>
-            </a:endParaRPr>
-          </a:p>
-          <a:p>
-            <a:pPr algn="ctr"/>
-            <a:endParaRPr lang="es-CO" sz="900" baseline="-25000" dirty="0" smtClean="0">
-              <a:solidFill>
-                <a:schemeClr val="tx1"/>
-              </a:solidFill>
-              <a:cs typeface="Arial" pitchFamily="34" charset="0"/>
-            </a:endParaRPr>
-          </a:p>
-          <a:p>
-            <a:pPr algn="ctr"/>
-            <a:endParaRPr lang="es-CO" sz="900" baseline="-25000" dirty="0">
-              <a:solidFill>
-                <a:schemeClr val="tx1"/>
-              </a:solidFill>
-              <a:cs typeface="Arial" pitchFamily="34" charset="0"/>
-            </a:endParaRPr>
-          </a:p>
-          <a:p>
-            <a:pPr algn="ctr"/>
-            <a:r>
-              <a:rPr lang="es-CO" sz="4000" baseline="-25000" dirty="0" smtClean="0">
-                <a:solidFill>
-                  <a:srgbClr val="FF0000"/>
-                </a:solidFill>
-                <a:cs typeface="Arial" pitchFamily="34" charset="0"/>
-              </a:rPr>
-              <a:t>1</a:t>
-            </a:r>
-            <a:endParaRPr lang="es-CO" sz="4000" baseline="-25000" dirty="0">
-              <a:solidFill>
-                <a:srgbClr val="FF0000"/>
-              </a:solidFill>
-              <a:cs typeface="Arial" pitchFamily="34" charset="0"/>
-            </a:endParaRPr>
-          </a:p>
-        </p:txBody>
-      </p:sp>
-      <p:cxnSp>
-        <p:nvCxnSpPr>
-          <p:cNvPr id="386" name="385 Conector recto"/>
-          <p:cNvCxnSpPr>
-            <a:stCxn id="387" idx="2"/>
-            <a:endCxn id="399" idx="0"/>
-          </p:cNvCxnSpPr>
-          <p:nvPr/>
-        </p:nvCxnSpPr>
-        <p:spPr>
-          <a:xfrm flipH="1">
-            <a:off x="2997843" y="8352153"/>
-            <a:ext cx="3" cy="117167"/>
-          </a:xfrm>
-          <a:prstGeom prst="line">
-            <a:avLst/>
-          </a:prstGeom>
-          <a:ln w="12700">
-            <a:solidFill>
-              <a:schemeClr val="tx1"/>
-            </a:solidFill>
-          </a:ln>
-        </p:spPr>
-        <p:style>
-          <a:lnRef idx="1">
-            <a:schemeClr val="accent1"/>
-          </a:lnRef>
-          <a:fillRef idx="0">
-            <a:schemeClr val="accent1"/>
-          </a:fillRef>
-          <a:effectRef idx="0">
-            <a:schemeClr val="accent1"/>
-          </a:effectRef>
-          <a:fontRef idx="minor">
-            <a:schemeClr val="tx1"/>
-          </a:fontRef>
-        </p:style>
-      </p:cxnSp>
-      <p:sp>
-        <p:nvSpPr>
-          <p:cNvPr id="387" name="Rectángulo 35"/>
-          <p:cNvSpPr/>
-          <p:nvPr/>
-        </p:nvSpPr>
-        <p:spPr>
-          <a:xfrm>
-            <a:off x="2557167" y="8122935"/>
-            <a:ext cx="881358" cy="229218"/>
-          </a:xfrm>
-          <a:prstGeom prst="rect">
-            <a:avLst/>
-          </a:prstGeom>
-          <a:ln>
-            <a:noFill/>
-          </a:ln>
-        </p:spPr>
-        <p:style>
-          <a:lnRef idx="2">
-            <a:schemeClr val="dk1"/>
-          </a:lnRef>
-          <a:fillRef idx="1">
-            <a:schemeClr val="lt1"/>
-          </a:fillRef>
-          <a:effectRef idx="0">
-            <a:schemeClr val="dk1"/>
-          </a:effectRef>
-          <a:fontRef idx="minor">
-            <a:schemeClr val="dk1"/>
-          </a:fontRef>
-        </p:style>
-        <p:txBody>
-          <a:bodyPr lIns="105683" tIns="52841" rIns="105683" bIns="52841" rtlCol="0" anchor="ctr"/>
-          <a:lstStyle/>
-          <a:p>
-            <a:pPr algn="ctr"/>
-            <a:r>
-              <a:rPr lang="es-CO" sz="900" dirty="0" smtClean="0">
-                <a:solidFill>
-                  <a:schemeClr val="tx1"/>
-                </a:solidFill>
-                <a:cs typeface="Arial" pitchFamily="34" charset="0"/>
-              </a:rPr>
-              <a:t>ejemplo    </a:t>
-            </a:r>
-            <a:endParaRPr lang="es-CO" sz="900" dirty="0">
-              <a:solidFill>
-                <a:schemeClr val="tx1"/>
-              </a:solidFill>
-              <a:cs typeface="Arial" pitchFamily="34" charset="0"/>
-            </a:endParaRPr>
-          </a:p>
-        </p:txBody>
-      </p:sp>
-      <p:cxnSp>
-        <p:nvCxnSpPr>
-          <p:cNvPr id="388" name="387 Conector recto"/>
-          <p:cNvCxnSpPr>
-            <a:stCxn id="358" idx="2"/>
-            <a:endCxn id="387" idx="0"/>
-          </p:cNvCxnSpPr>
-          <p:nvPr/>
-        </p:nvCxnSpPr>
-        <p:spPr>
-          <a:xfrm>
-            <a:off x="2991410" y="7942632"/>
-            <a:ext cx="6436" cy="180303"/>
-          </a:xfrm>
-          <a:prstGeom prst="line">
-            <a:avLst/>
-          </a:prstGeom>
-          <a:ln w="12700">
-            <a:solidFill>
-              <a:schemeClr val="tx1"/>
-            </a:solidFill>
-          </a:ln>
-        </p:spPr>
-        <p:style>
-          <a:lnRef idx="1">
-            <a:schemeClr val="accent1"/>
-          </a:lnRef>
-          <a:fillRef idx="0">
-            <a:schemeClr val="accent1"/>
-          </a:fillRef>
-          <a:effectRef idx="0">
-            <a:schemeClr val="accent1"/>
-          </a:effectRef>
-          <a:fontRef idx="minor">
-            <a:schemeClr val="tx1"/>
-          </a:fontRef>
-        </p:style>
-      </p:cxnSp>
       <p:cxnSp>
         <p:nvCxnSpPr>
           <p:cNvPr id="390" name="389 Conector recto"/>
@@ -5458,14 +5228,29 @@
           <a:p>
             <a:pPr algn="ctr"/>
             <a:r>
-              <a:rPr lang="es-CO" sz="900" dirty="0" smtClean="0">
-                <a:solidFill>
-                  <a:schemeClr val="tx1"/>
-                </a:solidFill>
-                <a:cs typeface="Arial" pitchFamily="34" charset="0"/>
-              </a:rPr>
-              <a:t>Poliedro    </a:t>
-            </a:r>
+              <a:rPr lang="es-CO" sz="900" dirty="0">
+                <a:solidFill>
+                  <a:schemeClr val="tx1"/>
+                </a:solidFill>
+                <a:cs typeface="Arial" pitchFamily="34" charset="0"/>
+              </a:rPr>
+              <a:t>p</a:t>
+            </a:r>
+            <a:r>
+              <a:rPr lang="es-CO" sz="900" dirty="0" smtClean="0">
+                <a:solidFill>
+                  <a:schemeClr val="tx1"/>
+                </a:solidFill>
+                <a:cs typeface="Arial" pitchFamily="34" charset="0"/>
+              </a:rPr>
+              <a:t>oliedro    </a:t>
+            </a:r>
+            <a:endParaRPr lang="es-CO" sz="900" dirty="0" smtClean="0">
+              <a:solidFill>
+                <a:schemeClr val="tx1"/>
+              </a:solidFill>
+              <a:cs typeface="Arial" pitchFamily="34" charset="0"/>
+            </a:endParaRPr>
           </a:p>
         </p:txBody>
       </p:sp>
@@ -5507,31 +5292,49 @@
           <a:p>
             <a:pPr algn="ctr"/>
             <a:r>
-              <a:rPr lang="es-CO" sz="900" dirty="0" smtClean="0">
-                <a:solidFill>
-                  <a:schemeClr val="tx1"/>
-                </a:solidFill>
-                <a:cs typeface="Arial" pitchFamily="34" charset="0"/>
-              </a:rPr>
-              <a:t>Delimitado  por   dos polígonos congruentes paralelos y  n </a:t>
-            </a:r>
-            <a:r>
-              <a:rPr lang="es-CO" sz="900" dirty="0" err="1" smtClean="0">
-                <a:solidFill>
-                  <a:schemeClr val="tx1"/>
-                </a:solidFill>
-                <a:cs typeface="Arial" pitchFamily="34" charset="0"/>
-              </a:rPr>
-              <a:t>paralegramos</a:t>
-            </a:r>
-            <a:r>
-              <a:rPr lang="es-CO" sz="900" dirty="0" smtClean="0">
-                <a:solidFill>
-                  <a:schemeClr val="tx1"/>
-                </a:solidFill>
-                <a:cs typeface="Arial" pitchFamily="34" charset="0"/>
-              </a:rPr>
-              <a:t> congruentes    </a:t>
+              <a:rPr lang="es-CO" sz="900" dirty="0">
+                <a:solidFill>
+                  <a:schemeClr val="tx1"/>
+                </a:solidFill>
+                <a:cs typeface="Arial" pitchFamily="34" charset="0"/>
+              </a:rPr>
+              <a:t>d</a:t>
+            </a:r>
+            <a:r>
+              <a:rPr lang="es-CO" sz="900" dirty="0" smtClean="0">
+                <a:solidFill>
+                  <a:schemeClr val="tx1"/>
+                </a:solidFill>
+                <a:cs typeface="Arial" pitchFamily="34" charset="0"/>
+              </a:rPr>
+              <a:t>elimitado  </a:t>
+            </a:r>
+            <a:r>
+              <a:rPr lang="es-CO" sz="900" dirty="0" smtClean="0">
+                <a:solidFill>
+                  <a:schemeClr val="tx1"/>
+                </a:solidFill>
+                <a:cs typeface="Arial" pitchFamily="34" charset="0"/>
+              </a:rPr>
+              <a:t>por   dos polígonos congruentes paralelos y  </a:t>
+            </a:r>
+            <a:r>
+              <a:rPr lang="es-CO" sz="900" i="1" dirty="0" smtClean="0">
+                <a:solidFill>
+                  <a:schemeClr val="tx1"/>
+                </a:solidFill>
+                <a:cs typeface="Arial" pitchFamily="34" charset="0"/>
+              </a:rPr>
+              <a:t>n</a:t>
+            </a:r>
+            <a:r>
+              <a:rPr lang="es-CO" sz="900" dirty="0" smtClean="0">
+                <a:solidFill>
+                  <a:schemeClr val="tx1"/>
+                </a:solidFill>
+                <a:cs typeface="Arial" pitchFamily="34" charset="0"/>
+              </a:rPr>
+              <a:t> paralegramos congruentes    </a:t>
             </a:r>
           </a:p>
         </p:txBody>
@@ -5574,54 +5377,16 @@
           </a:fontRef>
         </p:style>
       </p:cxnSp>
-      <p:cxnSp>
-        <p:nvCxnSpPr>
-          <p:cNvPr id="394" name="393 Conector recto"/>
-          <p:cNvCxnSpPr>
-            <a:stCxn id="395" idx="2"/>
-            <a:endCxn id="400" idx="0"/>
-          </p:cNvCxnSpPr>
-          <p:nvPr/>
-        </p:nvCxnSpPr>
-        <p:spPr>
-          <a:xfrm flipH="1">
-            <a:off x="4150368" y="8361678"/>
-            <a:ext cx="3" cy="117167"/>
-          </a:xfrm>
-          <a:prstGeom prst="line">
-            <a:avLst/>
-          </a:prstGeom>
-          <a:ln w="12700">
-            <a:solidFill>
-              <a:schemeClr val="tx1"/>
-            </a:solidFill>
-          </a:ln>
-        </p:spPr>
-        <p:style>
-          <a:lnRef idx="1">
-            <a:schemeClr val="accent1"/>
-          </a:lnRef>
-          <a:fillRef idx="0">
-            <a:schemeClr val="accent1"/>
-          </a:fillRef>
-          <a:effectRef idx="0">
-            <a:schemeClr val="accent1"/>
-          </a:effectRef>
-          <a:fontRef idx="minor">
-            <a:schemeClr val="tx1"/>
-          </a:fontRef>
-        </p:style>
-      </p:cxnSp>
       <p:sp>
         <p:nvSpPr>
-          <p:cNvPr id="395" name="Rectángulo 35"/>
+          <p:cNvPr id="416" name="Rectángulo 35"/>
           <p:cNvSpPr/>
           <p:nvPr/>
         </p:nvSpPr>
         <p:spPr>
           <a:xfrm>
-            <a:off x="3709692" y="8132460"/>
-            <a:ext cx="881358" cy="229218"/>
+            <a:off x="4914900" y="6765794"/>
+            <a:ext cx="895350" cy="282707"/>
           </a:xfrm>
           <a:prstGeom prst="rect">
             <a:avLst/>
@@ -5650,1095 +5415,41 @@
           <a:p>
             <a:pPr algn="ctr"/>
             <a:r>
+              <a:rPr lang="es-CO" sz="900" dirty="0" smtClean="0">
+                <a:solidFill>
+                  <a:schemeClr val="tx1"/>
+                </a:solidFill>
+                <a:cs typeface="Arial" pitchFamily="34" charset="0"/>
+              </a:rPr>
+              <a:t>es un </a:t>
+            </a:r>
+          </a:p>
+          <a:p>
+            <a:pPr algn="ctr"/>
+            <a:r>
               <a:rPr lang="es-CO" sz="900" dirty="0">
                 <a:solidFill>
                   <a:schemeClr val="tx1"/>
                 </a:solidFill>
                 <a:cs typeface="Arial" pitchFamily="34" charset="0"/>
               </a:rPr>
-              <a:t>e</a:t>
-            </a:r>
-            <a:r>
-              <a:rPr lang="es-CO" sz="900" dirty="0" smtClean="0">
-                <a:solidFill>
-                  <a:schemeClr val="tx1"/>
-                </a:solidFill>
-                <a:cs typeface="Arial" pitchFamily="34" charset="0"/>
-              </a:rPr>
-              <a:t>jemplo    </a:t>
-            </a:r>
-            <a:endParaRPr lang="es-CO" sz="900" dirty="0">
+              <a:t>p</a:t>
+            </a:r>
+            <a:r>
+              <a:rPr lang="es-CO" sz="900" dirty="0" smtClean="0">
+                <a:solidFill>
+                  <a:schemeClr val="tx1"/>
+                </a:solidFill>
+                <a:cs typeface="Arial" pitchFamily="34" charset="0"/>
+              </a:rPr>
+              <a:t>oliedro    </a:t>
+            </a:r>
+            <a:endParaRPr lang="es-CO" sz="900" dirty="0" smtClean="0">
               <a:solidFill>
                 <a:schemeClr val="tx1"/>
               </a:solidFill>
               <a:cs typeface="Arial" pitchFamily="34" charset="0"/>
             </a:endParaRPr>
-          </a:p>
-        </p:txBody>
-      </p:sp>
-      <p:cxnSp>
-        <p:nvCxnSpPr>
-          <p:cNvPr id="396" name="395 Conector recto"/>
-          <p:cNvCxnSpPr>
-            <a:stCxn id="392" idx="2"/>
-            <a:endCxn id="395" idx="0"/>
-          </p:cNvCxnSpPr>
-          <p:nvPr/>
-        </p:nvCxnSpPr>
-        <p:spPr>
-          <a:xfrm flipH="1">
-            <a:off x="4150371" y="7952157"/>
-            <a:ext cx="3089" cy="180303"/>
-          </a:xfrm>
-          <a:prstGeom prst="line">
-            <a:avLst/>
-          </a:prstGeom>
-          <a:ln w="12700">
-            <a:solidFill>
-              <a:schemeClr val="tx1"/>
-            </a:solidFill>
-          </a:ln>
-        </p:spPr>
-        <p:style>
-          <a:lnRef idx="1">
-            <a:schemeClr val="accent1"/>
-          </a:lnRef>
-          <a:fillRef idx="0">
-            <a:schemeClr val="accent1"/>
-          </a:fillRef>
-          <a:effectRef idx="0">
-            <a:schemeClr val="accent1"/>
-          </a:effectRef>
-          <a:fontRef idx="minor">
-            <a:schemeClr val="tx1"/>
-          </a:fontRef>
-        </p:style>
-      </p:cxnSp>
-      <p:pic>
-        <p:nvPicPr>
-          <p:cNvPr id="193" name="Picture 2" descr="E:\guion 11\imagenes mapa 11\1.gif"/>
-          <p:cNvPicPr>
-            <a:picLocks noChangeAspect="1" noChangeArrowheads="1"/>
-          </p:cNvPicPr>
-          <p:nvPr/>
-        </p:nvPicPr>
-        <p:blipFill>
-          <a:blip r:embed="rId3" cstate="print">
-            <a:extLst>
-              <a:ext uri="{28A0092B-C50C-407E-A947-70E740481C1C}">
-                <a14:useLocalDpi xmlns:a14="http://schemas.microsoft.com/office/drawing/2010/main" val="0"/>
-              </a:ext>
-            </a:extLst>
-          </a:blip>
-          <a:srcRect/>
-          <a:stretch>
-            <a:fillRect/>
-          </a:stretch>
-        </p:blipFill>
-        <p:spPr bwMode="auto">
-          <a:xfrm>
-            <a:off x="130712" y="8564186"/>
-            <a:ext cx="963145" cy="752783"/>
-          </a:xfrm>
-          <a:prstGeom prst="rect">
-            <a:avLst/>
-          </a:prstGeom>
-          <a:noFill/>
-          <a:extLst>
-            <a:ext uri="{909E8E84-426E-40DD-AFC4-6F175D3DCCD1}">
-              <a14:hiddenFill xmlns:a14="http://schemas.microsoft.com/office/drawing/2010/main">
-                <a:solidFill>
-                  <a:srgbClr val="FFFFFF"/>
-                </a:solidFill>
-              </a14:hiddenFill>
-            </a:ext>
-          </a:extLst>
-        </p:spPr>
-      </p:pic>
-      <p:sp>
-        <p:nvSpPr>
-          <p:cNvPr id="398" name="Rectángulo 33"/>
-          <p:cNvSpPr/>
-          <p:nvPr/>
-        </p:nvSpPr>
-        <p:spPr>
-          <a:xfrm>
-            <a:off x="1228725" y="8459795"/>
-            <a:ext cx="1118885" cy="1174823"/>
-          </a:xfrm>
-          <a:prstGeom prst="rect">
-            <a:avLst/>
-          </a:prstGeom>
-          <a:solidFill>
-            <a:schemeClr val="bg1"/>
-          </a:solidFill>
-        </p:spPr>
-        <p:style>
-          <a:lnRef idx="2">
-            <a:schemeClr val="dk1"/>
-          </a:lnRef>
-          <a:fillRef idx="1">
-            <a:schemeClr val="lt1"/>
-          </a:fillRef>
-          <a:effectRef idx="0">
-            <a:schemeClr val="dk1"/>
-          </a:effectRef>
-          <a:fontRef idx="minor">
-            <a:schemeClr val="dk1"/>
-          </a:fontRef>
-        </p:style>
-        <p:txBody>
-          <a:bodyPr lIns="105683" tIns="52841" rIns="105683" bIns="52841" rtlCol="0" anchor="ctr"/>
-          <a:lstStyle/>
-          <a:p>
-            <a:pPr algn="ctr"/>
-            <a:endParaRPr lang="es-CO" sz="900" baseline="-25000" dirty="0" smtClean="0">
-              <a:solidFill>
-                <a:schemeClr val="tx1"/>
-              </a:solidFill>
-              <a:cs typeface="Arial" pitchFamily="34" charset="0"/>
-            </a:endParaRPr>
-          </a:p>
-          <a:p>
-            <a:pPr algn="ctr"/>
-            <a:endParaRPr lang="es-CO" sz="900" baseline="-25000" dirty="0">
-              <a:solidFill>
-                <a:schemeClr val="tx1"/>
-              </a:solidFill>
-              <a:cs typeface="Arial" pitchFamily="34" charset="0"/>
-            </a:endParaRPr>
-          </a:p>
-          <a:p>
-            <a:pPr algn="ctr"/>
-            <a:endParaRPr lang="es-CO" sz="900" baseline="-25000" dirty="0" smtClean="0">
-              <a:solidFill>
-                <a:schemeClr val="tx1"/>
-              </a:solidFill>
-              <a:cs typeface="Arial" pitchFamily="34" charset="0"/>
-            </a:endParaRPr>
-          </a:p>
-          <a:p>
-            <a:pPr algn="ctr"/>
-            <a:endParaRPr lang="es-CO" sz="900" baseline="-25000" dirty="0">
-              <a:solidFill>
-                <a:schemeClr val="tx1"/>
-              </a:solidFill>
-              <a:cs typeface="Arial" pitchFamily="34" charset="0"/>
-            </a:endParaRPr>
-          </a:p>
-          <a:p>
-            <a:pPr algn="ctr"/>
-            <a:endParaRPr lang="es-CO" sz="900" baseline="-25000" dirty="0" smtClean="0">
-              <a:solidFill>
-                <a:schemeClr val="tx1"/>
-              </a:solidFill>
-              <a:cs typeface="Arial" pitchFamily="34" charset="0"/>
-            </a:endParaRPr>
-          </a:p>
-          <a:p>
-            <a:pPr algn="ctr"/>
-            <a:endParaRPr lang="es-CO" sz="900" baseline="-25000" dirty="0">
-              <a:solidFill>
-                <a:schemeClr val="tx1"/>
-              </a:solidFill>
-              <a:cs typeface="Arial" pitchFamily="34" charset="0"/>
-            </a:endParaRPr>
-          </a:p>
-          <a:p>
-            <a:pPr algn="ctr"/>
-            <a:r>
-              <a:rPr lang="es-CO" sz="4000" baseline="-25000" dirty="0" smtClean="0">
-                <a:solidFill>
-                  <a:srgbClr val="FF0000"/>
-                </a:solidFill>
-                <a:cs typeface="Arial" pitchFamily="34" charset="0"/>
-              </a:rPr>
-              <a:t>2</a:t>
-            </a:r>
-            <a:endParaRPr lang="es-CO" sz="4000" baseline="-25000" dirty="0">
-              <a:solidFill>
-                <a:srgbClr val="FF0000"/>
-              </a:solidFill>
-              <a:cs typeface="Arial" pitchFamily="34" charset="0"/>
-            </a:endParaRPr>
-          </a:p>
-        </p:txBody>
-      </p:sp>
-      <p:pic>
-        <p:nvPicPr>
-          <p:cNvPr id="215" name="Picture 4" descr="E:\guion 11\imagenes mapa 11\2.gif"/>
-          <p:cNvPicPr>
-            <a:picLocks noChangeAspect="1" noChangeArrowheads="1"/>
-          </p:cNvPicPr>
-          <p:nvPr/>
-        </p:nvPicPr>
-        <p:blipFill>
-          <a:blip r:embed="rId4" cstate="print">
-            <a:extLst>
-              <a:ext uri="{28A0092B-C50C-407E-A947-70E740481C1C}">
-                <a14:useLocalDpi xmlns:a14="http://schemas.microsoft.com/office/drawing/2010/main" val="0"/>
-              </a:ext>
-            </a:extLst>
-          </a:blip>
-          <a:srcRect/>
-          <a:stretch>
-            <a:fillRect/>
-          </a:stretch>
-        </p:blipFill>
-        <p:spPr bwMode="auto">
-          <a:xfrm>
-            <a:off x="1275751" y="8526727"/>
-            <a:ext cx="1007230" cy="770549"/>
-          </a:xfrm>
-          <a:prstGeom prst="rect">
-            <a:avLst/>
-          </a:prstGeom>
-          <a:noFill/>
-          <a:extLst>
-            <a:ext uri="{909E8E84-426E-40DD-AFC4-6F175D3DCCD1}">
-              <a14:hiddenFill xmlns:a14="http://schemas.microsoft.com/office/drawing/2010/main">
-                <a:solidFill>
-                  <a:srgbClr val="FFFFFF"/>
-                </a:solidFill>
-              </a14:hiddenFill>
-            </a:ext>
-          </a:extLst>
-        </p:spPr>
-      </p:pic>
-      <p:sp>
-        <p:nvSpPr>
-          <p:cNvPr id="399" name="Rectángulo 33"/>
-          <p:cNvSpPr/>
-          <p:nvPr/>
-        </p:nvSpPr>
-        <p:spPr>
-          <a:xfrm>
-            <a:off x="2438400" y="8469320"/>
-            <a:ext cx="1118885" cy="1174823"/>
-          </a:xfrm>
-          <a:prstGeom prst="rect">
-            <a:avLst/>
-          </a:prstGeom>
-          <a:solidFill>
-            <a:schemeClr val="bg1"/>
-          </a:solidFill>
-        </p:spPr>
-        <p:style>
-          <a:lnRef idx="2">
-            <a:schemeClr val="dk1"/>
-          </a:lnRef>
-          <a:fillRef idx="1">
-            <a:schemeClr val="lt1"/>
-          </a:fillRef>
-          <a:effectRef idx="0">
-            <a:schemeClr val="dk1"/>
-          </a:effectRef>
-          <a:fontRef idx="minor">
-            <a:schemeClr val="dk1"/>
-          </a:fontRef>
-        </p:style>
-        <p:txBody>
-          <a:bodyPr lIns="105683" tIns="52841" rIns="105683" bIns="52841" rtlCol="0" anchor="ctr"/>
-          <a:lstStyle/>
-          <a:p>
-            <a:pPr algn="ctr"/>
-            <a:endParaRPr lang="es-CO" sz="900" baseline="-25000" dirty="0" smtClean="0">
-              <a:solidFill>
-                <a:schemeClr val="tx1"/>
-              </a:solidFill>
-              <a:cs typeface="Arial" pitchFamily="34" charset="0"/>
-            </a:endParaRPr>
-          </a:p>
-          <a:p>
-            <a:pPr algn="ctr"/>
-            <a:endParaRPr lang="es-CO" sz="900" baseline="-25000" dirty="0">
-              <a:solidFill>
-                <a:schemeClr val="tx1"/>
-              </a:solidFill>
-              <a:cs typeface="Arial" pitchFamily="34" charset="0"/>
-            </a:endParaRPr>
-          </a:p>
-          <a:p>
-            <a:pPr algn="ctr"/>
-            <a:endParaRPr lang="es-CO" sz="900" baseline="-25000" dirty="0" smtClean="0">
-              <a:solidFill>
-                <a:schemeClr val="tx1"/>
-              </a:solidFill>
-              <a:cs typeface="Arial" pitchFamily="34" charset="0"/>
-            </a:endParaRPr>
-          </a:p>
-          <a:p>
-            <a:pPr algn="ctr"/>
-            <a:endParaRPr lang="es-CO" sz="900" baseline="-25000" dirty="0">
-              <a:solidFill>
-                <a:schemeClr val="tx1"/>
-              </a:solidFill>
-              <a:cs typeface="Arial" pitchFamily="34" charset="0"/>
-            </a:endParaRPr>
-          </a:p>
-          <a:p>
-            <a:pPr algn="ctr"/>
-            <a:endParaRPr lang="es-CO" sz="900" baseline="-25000" dirty="0" smtClean="0">
-              <a:solidFill>
-                <a:schemeClr val="tx1"/>
-              </a:solidFill>
-              <a:cs typeface="Arial" pitchFamily="34" charset="0"/>
-            </a:endParaRPr>
-          </a:p>
-          <a:p>
-            <a:pPr algn="ctr"/>
-            <a:endParaRPr lang="es-CO" sz="900" baseline="-25000" dirty="0">
-              <a:solidFill>
-                <a:schemeClr val="tx1"/>
-              </a:solidFill>
-              <a:cs typeface="Arial" pitchFamily="34" charset="0"/>
-            </a:endParaRPr>
-          </a:p>
-          <a:p>
-            <a:pPr algn="ctr"/>
-            <a:r>
-              <a:rPr lang="es-CO" sz="4000" baseline="-25000" dirty="0" smtClean="0">
-                <a:solidFill>
-                  <a:srgbClr val="FF0000"/>
-                </a:solidFill>
-                <a:cs typeface="Arial" pitchFamily="34" charset="0"/>
-              </a:rPr>
-              <a:t>3</a:t>
-            </a:r>
-            <a:endParaRPr lang="es-CO" sz="4000" baseline="-25000" dirty="0">
-              <a:solidFill>
-                <a:srgbClr val="FF0000"/>
-              </a:solidFill>
-              <a:cs typeface="Arial" pitchFamily="34" charset="0"/>
-            </a:endParaRPr>
-          </a:p>
-        </p:txBody>
-      </p:sp>
-      <p:pic>
-        <p:nvPicPr>
-          <p:cNvPr id="217" name="Picture 6" descr="E:\guion 11\imagenes mapa 11\3.gif"/>
-          <p:cNvPicPr>
-            <a:picLocks noChangeAspect="1" noChangeArrowheads="1"/>
-          </p:cNvPicPr>
-          <p:nvPr/>
-        </p:nvPicPr>
-        <p:blipFill>
-          <a:blip r:embed="rId5" cstate="print">
-            <a:extLst>
-              <a:ext uri="{28A0092B-C50C-407E-A947-70E740481C1C}">
-                <a14:useLocalDpi xmlns:a14="http://schemas.microsoft.com/office/drawing/2010/main" val="0"/>
-              </a:ext>
-            </a:extLst>
-          </a:blip>
-          <a:srcRect/>
-          <a:stretch>
-            <a:fillRect/>
-          </a:stretch>
-        </p:blipFill>
-        <p:spPr bwMode="auto">
-          <a:xfrm>
-            <a:off x="2493695" y="8502029"/>
-            <a:ext cx="1040080" cy="827492"/>
-          </a:xfrm>
-          <a:prstGeom prst="rect">
-            <a:avLst/>
-          </a:prstGeom>
-          <a:noFill/>
-          <a:extLst>
-            <a:ext uri="{909E8E84-426E-40DD-AFC4-6F175D3DCCD1}">
-              <a14:hiddenFill xmlns:a14="http://schemas.microsoft.com/office/drawing/2010/main">
-                <a:solidFill>
-                  <a:srgbClr val="FFFFFF"/>
-                </a:solidFill>
-              </a14:hiddenFill>
-            </a:ext>
-          </a:extLst>
-        </p:spPr>
-      </p:pic>
-      <p:sp>
-        <p:nvSpPr>
-          <p:cNvPr id="400" name="Rectángulo 33"/>
-          <p:cNvSpPr/>
-          <p:nvPr/>
-        </p:nvSpPr>
-        <p:spPr>
-          <a:xfrm>
-            <a:off x="3590925" y="8478845"/>
-            <a:ext cx="1118885" cy="1174823"/>
-          </a:xfrm>
-          <a:prstGeom prst="rect">
-            <a:avLst/>
-          </a:prstGeom>
-          <a:solidFill>
-            <a:schemeClr val="bg1"/>
-          </a:solidFill>
-        </p:spPr>
-        <p:style>
-          <a:lnRef idx="2">
-            <a:schemeClr val="dk1"/>
-          </a:lnRef>
-          <a:fillRef idx="1">
-            <a:schemeClr val="lt1"/>
-          </a:fillRef>
-          <a:effectRef idx="0">
-            <a:schemeClr val="dk1"/>
-          </a:effectRef>
-          <a:fontRef idx="minor">
-            <a:schemeClr val="dk1"/>
-          </a:fontRef>
-        </p:style>
-        <p:txBody>
-          <a:bodyPr lIns="105683" tIns="52841" rIns="105683" bIns="52841" rtlCol="0" anchor="ctr"/>
-          <a:lstStyle/>
-          <a:p>
-            <a:pPr algn="ctr"/>
-            <a:endParaRPr lang="es-CO" sz="900" baseline="-25000" dirty="0" smtClean="0">
-              <a:solidFill>
-                <a:schemeClr val="tx1"/>
-              </a:solidFill>
-              <a:cs typeface="Arial" pitchFamily="34" charset="0"/>
-            </a:endParaRPr>
-          </a:p>
-          <a:p>
-            <a:pPr algn="ctr"/>
-            <a:endParaRPr lang="es-CO" sz="900" baseline="-25000" dirty="0">
-              <a:solidFill>
-                <a:schemeClr val="tx1"/>
-              </a:solidFill>
-              <a:cs typeface="Arial" pitchFamily="34" charset="0"/>
-            </a:endParaRPr>
-          </a:p>
-          <a:p>
-            <a:pPr algn="ctr"/>
-            <a:endParaRPr lang="es-CO" sz="900" baseline="-25000" dirty="0" smtClean="0">
-              <a:solidFill>
-                <a:schemeClr val="tx1"/>
-              </a:solidFill>
-              <a:cs typeface="Arial" pitchFamily="34" charset="0"/>
-            </a:endParaRPr>
-          </a:p>
-          <a:p>
-            <a:pPr algn="ctr"/>
-            <a:endParaRPr lang="es-CO" sz="900" baseline="-25000" dirty="0">
-              <a:solidFill>
-                <a:schemeClr val="tx1"/>
-              </a:solidFill>
-              <a:cs typeface="Arial" pitchFamily="34" charset="0"/>
-            </a:endParaRPr>
-          </a:p>
-          <a:p>
-            <a:pPr algn="ctr"/>
-            <a:endParaRPr lang="es-CO" sz="900" baseline="-25000" dirty="0" smtClean="0">
-              <a:solidFill>
-                <a:schemeClr val="tx1"/>
-              </a:solidFill>
-              <a:cs typeface="Arial" pitchFamily="34" charset="0"/>
-            </a:endParaRPr>
-          </a:p>
-          <a:p>
-            <a:pPr algn="ctr"/>
-            <a:endParaRPr lang="es-CO" sz="900" baseline="-25000" dirty="0">
-              <a:solidFill>
-                <a:schemeClr val="tx1"/>
-              </a:solidFill>
-              <a:cs typeface="Arial" pitchFamily="34" charset="0"/>
-            </a:endParaRPr>
-          </a:p>
-          <a:p>
-            <a:pPr algn="ctr"/>
-            <a:r>
-              <a:rPr lang="es-CO" sz="4000" baseline="-25000" dirty="0">
-                <a:solidFill>
-                  <a:srgbClr val="FF0000"/>
-                </a:solidFill>
-                <a:cs typeface="Arial" pitchFamily="34" charset="0"/>
-              </a:rPr>
-              <a:t>4</a:t>
-            </a:r>
-          </a:p>
-        </p:txBody>
-      </p:sp>
-      <p:sp>
-        <p:nvSpPr>
-          <p:cNvPr id="402" name="Rectángulo 33"/>
-          <p:cNvSpPr/>
-          <p:nvPr/>
-        </p:nvSpPr>
-        <p:spPr>
-          <a:xfrm>
-            <a:off x="4810125" y="8497895"/>
-            <a:ext cx="1118885" cy="1174823"/>
-          </a:xfrm>
-          <a:prstGeom prst="rect">
-            <a:avLst/>
-          </a:prstGeom>
-          <a:solidFill>
-            <a:schemeClr val="bg1"/>
-          </a:solidFill>
-        </p:spPr>
-        <p:style>
-          <a:lnRef idx="2">
-            <a:schemeClr val="dk1"/>
-          </a:lnRef>
-          <a:fillRef idx="1">
-            <a:schemeClr val="lt1"/>
-          </a:fillRef>
-          <a:effectRef idx="0">
-            <a:schemeClr val="dk1"/>
-          </a:effectRef>
-          <a:fontRef idx="minor">
-            <a:schemeClr val="dk1"/>
-          </a:fontRef>
-        </p:style>
-        <p:txBody>
-          <a:bodyPr lIns="105683" tIns="52841" rIns="105683" bIns="52841" rtlCol="0" anchor="ctr"/>
-          <a:lstStyle/>
-          <a:p>
-            <a:pPr algn="ctr"/>
-            <a:endParaRPr lang="es-CO" sz="900" baseline="-25000" dirty="0" smtClean="0">
-              <a:solidFill>
-                <a:schemeClr val="tx1"/>
-              </a:solidFill>
-              <a:cs typeface="Arial" pitchFamily="34" charset="0"/>
-            </a:endParaRPr>
-          </a:p>
-          <a:p>
-            <a:pPr algn="ctr"/>
-            <a:endParaRPr lang="es-CO" sz="900" baseline="-25000" dirty="0">
-              <a:solidFill>
-                <a:schemeClr val="tx1"/>
-              </a:solidFill>
-              <a:cs typeface="Arial" pitchFamily="34" charset="0"/>
-            </a:endParaRPr>
-          </a:p>
-          <a:p>
-            <a:pPr algn="ctr"/>
-            <a:endParaRPr lang="es-CO" sz="900" baseline="-25000" dirty="0" smtClean="0">
-              <a:solidFill>
-                <a:schemeClr val="tx1"/>
-              </a:solidFill>
-              <a:cs typeface="Arial" pitchFamily="34" charset="0"/>
-            </a:endParaRPr>
-          </a:p>
-          <a:p>
-            <a:pPr algn="ctr"/>
-            <a:endParaRPr lang="es-CO" sz="900" baseline="-25000" dirty="0">
-              <a:solidFill>
-                <a:schemeClr val="tx1"/>
-              </a:solidFill>
-              <a:cs typeface="Arial" pitchFamily="34" charset="0"/>
-            </a:endParaRPr>
-          </a:p>
-          <a:p>
-            <a:pPr algn="ctr"/>
-            <a:endParaRPr lang="es-CO" sz="900" baseline="-25000" dirty="0" smtClean="0">
-              <a:solidFill>
-                <a:schemeClr val="tx1"/>
-              </a:solidFill>
-              <a:cs typeface="Arial" pitchFamily="34" charset="0"/>
-            </a:endParaRPr>
-          </a:p>
-          <a:p>
-            <a:pPr algn="ctr"/>
-            <a:endParaRPr lang="es-CO" sz="900" baseline="-25000" dirty="0">
-              <a:solidFill>
-                <a:schemeClr val="tx1"/>
-              </a:solidFill>
-              <a:cs typeface="Arial" pitchFamily="34" charset="0"/>
-            </a:endParaRPr>
-          </a:p>
-          <a:p>
-            <a:pPr algn="ctr"/>
-            <a:r>
-              <a:rPr lang="es-CO" sz="4000" baseline="-25000" dirty="0" smtClean="0">
-                <a:solidFill>
-                  <a:srgbClr val="FF0000"/>
-                </a:solidFill>
-                <a:cs typeface="Arial" pitchFamily="34" charset="0"/>
-              </a:rPr>
-              <a:t>5</a:t>
-            </a:r>
-            <a:endParaRPr lang="es-CO" sz="4000" baseline="-25000" dirty="0">
-              <a:solidFill>
-                <a:srgbClr val="FF0000"/>
-              </a:solidFill>
-              <a:cs typeface="Arial" pitchFamily="34" charset="0"/>
-            </a:endParaRPr>
-          </a:p>
-        </p:txBody>
-      </p:sp>
-      <p:pic>
-        <p:nvPicPr>
-          <p:cNvPr id="404" name="Picture 11" descr="E:\guion 11\imagenes mapa 11\5.gif"/>
-          <p:cNvPicPr>
-            <a:picLocks noChangeAspect="1" noChangeArrowheads="1"/>
-          </p:cNvPicPr>
-          <p:nvPr/>
-        </p:nvPicPr>
-        <p:blipFill>
-          <a:blip r:embed="rId6" cstate="print">
-            <a:extLst>
-              <a:ext uri="{28A0092B-C50C-407E-A947-70E740481C1C}">
-                <a14:useLocalDpi xmlns:a14="http://schemas.microsoft.com/office/drawing/2010/main" val="0"/>
-              </a:ext>
-            </a:extLst>
-          </a:blip>
-          <a:srcRect/>
-          <a:stretch>
-            <a:fillRect/>
-          </a:stretch>
-        </p:blipFill>
-        <p:spPr bwMode="auto">
-          <a:xfrm>
-            <a:off x="3697029" y="8522215"/>
-            <a:ext cx="880328" cy="803929"/>
-          </a:xfrm>
-          <a:prstGeom prst="rect">
-            <a:avLst/>
-          </a:prstGeom>
-          <a:noFill/>
-          <a:extLst>
-            <a:ext uri="{909E8E84-426E-40DD-AFC4-6F175D3DCCD1}">
-              <a14:hiddenFill xmlns:a14="http://schemas.microsoft.com/office/drawing/2010/main">
-                <a:solidFill>
-                  <a:srgbClr val="FFFFFF"/>
-                </a:solidFill>
-              </a14:hiddenFill>
-            </a:ext>
-          </a:extLst>
-        </p:spPr>
-      </p:pic>
-      <p:sp>
-        <p:nvSpPr>
-          <p:cNvPr id="405" name="Rectángulo 33"/>
-          <p:cNvSpPr/>
-          <p:nvPr/>
-        </p:nvSpPr>
-        <p:spPr>
-          <a:xfrm>
-            <a:off x="6029797" y="8488370"/>
-            <a:ext cx="1118885" cy="1174823"/>
-          </a:xfrm>
-          <a:prstGeom prst="rect">
-            <a:avLst/>
-          </a:prstGeom>
-          <a:solidFill>
-            <a:schemeClr val="bg1"/>
-          </a:solidFill>
-        </p:spPr>
-        <p:style>
-          <a:lnRef idx="2">
-            <a:schemeClr val="dk1"/>
-          </a:lnRef>
-          <a:fillRef idx="1">
-            <a:schemeClr val="lt1"/>
-          </a:fillRef>
-          <a:effectRef idx="0">
-            <a:schemeClr val="dk1"/>
-          </a:effectRef>
-          <a:fontRef idx="minor">
-            <a:schemeClr val="dk1"/>
-          </a:fontRef>
-        </p:style>
-        <p:txBody>
-          <a:bodyPr lIns="105683" tIns="52841" rIns="105683" bIns="52841" rtlCol="0" anchor="ctr"/>
-          <a:lstStyle/>
-          <a:p>
-            <a:pPr algn="ctr"/>
-            <a:endParaRPr lang="es-CO" sz="900" baseline="-25000" dirty="0" smtClean="0">
-              <a:solidFill>
-                <a:schemeClr val="tx1"/>
-              </a:solidFill>
-              <a:cs typeface="Arial" pitchFamily="34" charset="0"/>
-            </a:endParaRPr>
-          </a:p>
-          <a:p>
-            <a:pPr algn="ctr"/>
-            <a:endParaRPr lang="es-CO" sz="900" baseline="-25000" dirty="0">
-              <a:solidFill>
-                <a:schemeClr val="tx1"/>
-              </a:solidFill>
-              <a:cs typeface="Arial" pitchFamily="34" charset="0"/>
-            </a:endParaRPr>
-          </a:p>
-          <a:p>
-            <a:pPr algn="ctr"/>
-            <a:endParaRPr lang="es-CO" sz="900" baseline="-25000" dirty="0" smtClean="0">
-              <a:solidFill>
-                <a:schemeClr val="tx1"/>
-              </a:solidFill>
-              <a:cs typeface="Arial" pitchFamily="34" charset="0"/>
-            </a:endParaRPr>
-          </a:p>
-          <a:p>
-            <a:pPr algn="ctr"/>
-            <a:endParaRPr lang="es-CO" sz="900" baseline="-25000" dirty="0">
-              <a:solidFill>
-                <a:schemeClr val="tx1"/>
-              </a:solidFill>
-              <a:cs typeface="Arial" pitchFamily="34" charset="0"/>
-            </a:endParaRPr>
-          </a:p>
-          <a:p>
-            <a:pPr algn="ctr"/>
-            <a:endParaRPr lang="es-CO" sz="900" baseline="-25000" dirty="0" smtClean="0">
-              <a:solidFill>
-                <a:schemeClr val="tx1"/>
-              </a:solidFill>
-              <a:cs typeface="Arial" pitchFamily="34" charset="0"/>
-            </a:endParaRPr>
-          </a:p>
-          <a:p>
-            <a:pPr algn="ctr"/>
-            <a:endParaRPr lang="es-CO" sz="900" baseline="-25000" dirty="0">
-              <a:solidFill>
-                <a:schemeClr val="tx1"/>
-              </a:solidFill>
-              <a:cs typeface="Arial" pitchFamily="34" charset="0"/>
-            </a:endParaRPr>
-          </a:p>
-          <a:p>
-            <a:pPr algn="ctr"/>
-            <a:r>
-              <a:rPr lang="es-CO" sz="4000" baseline="-25000" dirty="0">
-                <a:solidFill>
-                  <a:srgbClr val="FF0000"/>
-                </a:solidFill>
-                <a:cs typeface="Arial" pitchFamily="34" charset="0"/>
-              </a:rPr>
-              <a:t>6</a:t>
-            </a:r>
-          </a:p>
-        </p:txBody>
-      </p:sp>
-      <p:pic>
-        <p:nvPicPr>
-          <p:cNvPr id="406" name="Picture 13" descr="E:\guion 11\imagenes mapa 11\6.gif"/>
-          <p:cNvPicPr>
-            <a:picLocks noChangeAspect="1" noChangeArrowheads="1"/>
-          </p:cNvPicPr>
-          <p:nvPr/>
-        </p:nvPicPr>
-        <p:blipFill>
-          <a:blip r:embed="rId7" cstate="print">
-            <a:extLst>
-              <a:ext uri="{28A0092B-C50C-407E-A947-70E740481C1C}">
-                <a14:useLocalDpi xmlns:a14="http://schemas.microsoft.com/office/drawing/2010/main" val="0"/>
-              </a:ext>
-            </a:extLst>
-          </a:blip>
-          <a:srcRect/>
-          <a:stretch>
-            <a:fillRect/>
-          </a:stretch>
-        </p:blipFill>
-        <p:spPr bwMode="auto">
-          <a:xfrm>
-            <a:off x="6104581" y="8534825"/>
-            <a:ext cx="999315" cy="793107"/>
-          </a:xfrm>
-          <a:prstGeom prst="rect">
-            <a:avLst/>
-          </a:prstGeom>
-          <a:noFill/>
-          <a:extLst>
-            <a:ext uri="{909E8E84-426E-40DD-AFC4-6F175D3DCCD1}">
-              <a14:hiddenFill xmlns:a14="http://schemas.microsoft.com/office/drawing/2010/main">
-                <a:solidFill>
-                  <a:srgbClr val="FFFFFF"/>
-                </a:solidFill>
-              </a14:hiddenFill>
-            </a:ext>
-          </a:extLst>
-        </p:spPr>
-      </p:pic>
-      <p:sp>
-        <p:nvSpPr>
-          <p:cNvPr id="407" name="Rectángulo 33"/>
-          <p:cNvSpPr/>
-          <p:nvPr/>
-        </p:nvSpPr>
-        <p:spPr>
-          <a:xfrm>
-            <a:off x="7278044" y="8507420"/>
-            <a:ext cx="1118885" cy="1174823"/>
-          </a:xfrm>
-          <a:prstGeom prst="rect">
-            <a:avLst/>
-          </a:prstGeom>
-          <a:solidFill>
-            <a:schemeClr val="bg1"/>
-          </a:solidFill>
-        </p:spPr>
-        <p:style>
-          <a:lnRef idx="2">
-            <a:schemeClr val="dk1"/>
-          </a:lnRef>
-          <a:fillRef idx="1">
-            <a:schemeClr val="lt1"/>
-          </a:fillRef>
-          <a:effectRef idx="0">
-            <a:schemeClr val="dk1"/>
-          </a:effectRef>
-          <a:fontRef idx="minor">
-            <a:schemeClr val="dk1"/>
-          </a:fontRef>
-        </p:style>
-        <p:txBody>
-          <a:bodyPr lIns="105683" tIns="52841" rIns="105683" bIns="52841" rtlCol="0" anchor="ctr"/>
-          <a:lstStyle/>
-          <a:p>
-            <a:pPr algn="ctr"/>
-            <a:endParaRPr lang="es-CO" sz="900" baseline="-25000" dirty="0" smtClean="0">
-              <a:solidFill>
-                <a:schemeClr val="tx1"/>
-              </a:solidFill>
-              <a:cs typeface="Arial" pitchFamily="34" charset="0"/>
-            </a:endParaRPr>
-          </a:p>
-          <a:p>
-            <a:pPr algn="ctr"/>
-            <a:endParaRPr lang="es-CO" sz="900" baseline="-25000" dirty="0">
-              <a:solidFill>
-                <a:schemeClr val="tx1"/>
-              </a:solidFill>
-              <a:cs typeface="Arial" pitchFamily="34" charset="0"/>
-            </a:endParaRPr>
-          </a:p>
-          <a:p>
-            <a:pPr algn="ctr"/>
-            <a:endParaRPr lang="es-CO" sz="900" baseline="-25000" dirty="0" smtClean="0">
-              <a:solidFill>
-                <a:schemeClr val="tx1"/>
-              </a:solidFill>
-              <a:cs typeface="Arial" pitchFamily="34" charset="0"/>
-            </a:endParaRPr>
-          </a:p>
-          <a:p>
-            <a:pPr algn="ctr"/>
-            <a:endParaRPr lang="es-CO" sz="900" baseline="-25000" dirty="0">
-              <a:solidFill>
-                <a:schemeClr val="tx1"/>
-              </a:solidFill>
-              <a:cs typeface="Arial" pitchFamily="34" charset="0"/>
-            </a:endParaRPr>
-          </a:p>
-          <a:p>
-            <a:pPr algn="ctr"/>
-            <a:endParaRPr lang="es-CO" sz="900" baseline="-25000" dirty="0" smtClean="0">
-              <a:solidFill>
-                <a:schemeClr val="tx1"/>
-              </a:solidFill>
-              <a:cs typeface="Arial" pitchFamily="34" charset="0"/>
-            </a:endParaRPr>
-          </a:p>
-          <a:p>
-            <a:pPr algn="ctr"/>
-            <a:endParaRPr lang="es-CO" sz="900" baseline="-25000" dirty="0">
-              <a:solidFill>
-                <a:schemeClr val="tx1"/>
-              </a:solidFill>
-              <a:cs typeface="Arial" pitchFamily="34" charset="0"/>
-            </a:endParaRPr>
-          </a:p>
-          <a:p>
-            <a:pPr algn="ctr"/>
-            <a:r>
-              <a:rPr lang="es-CO" sz="4000" baseline="-25000" dirty="0" smtClean="0">
-                <a:solidFill>
-                  <a:srgbClr val="FF0000"/>
-                </a:solidFill>
-                <a:cs typeface="Arial" pitchFamily="34" charset="0"/>
-              </a:rPr>
-              <a:t>7</a:t>
-            </a:r>
-            <a:endParaRPr lang="es-CO" sz="4000" baseline="-25000" dirty="0">
-              <a:solidFill>
-                <a:srgbClr val="FF0000"/>
-              </a:solidFill>
-              <a:cs typeface="Arial" pitchFamily="34" charset="0"/>
-            </a:endParaRPr>
-          </a:p>
-        </p:txBody>
-      </p:sp>
-      <p:pic>
-        <p:nvPicPr>
-          <p:cNvPr id="408" name="Picture 15" descr="E:\guion 11\imagenes mapa 11\5.gif"/>
-          <p:cNvPicPr>
-            <a:picLocks noChangeAspect="1" noChangeArrowheads="1"/>
-          </p:cNvPicPr>
-          <p:nvPr/>
-        </p:nvPicPr>
-        <p:blipFill>
-          <a:blip r:embed="rId8" cstate="print">
-            <a:extLst>
-              <a:ext uri="{28A0092B-C50C-407E-A947-70E740481C1C}">
-                <a14:useLocalDpi xmlns:a14="http://schemas.microsoft.com/office/drawing/2010/main" val="0"/>
-              </a:ext>
-            </a:extLst>
-          </a:blip>
-          <a:srcRect/>
-          <a:stretch>
-            <a:fillRect/>
-          </a:stretch>
-        </p:blipFill>
-        <p:spPr bwMode="auto">
-          <a:xfrm>
-            <a:off x="4888351" y="8585173"/>
-            <a:ext cx="1014775" cy="747556"/>
-          </a:xfrm>
-          <a:prstGeom prst="rect">
-            <a:avLst/>
-          </a:prstGeom>
-          <a:noFill/>
-          <a:extLst>
-            <a:ext uri="{909E8E84-426E-40DD-AFC4-6F175D3DCCD1}">
-              <a14:hiddenFill xmlns:a14="http://schemas.microsoft.com/office/drawing/2010/main">
-                <a:solidFill>
-                  <a:srgbClr val="FFFFFF"/>
-                </a:solidFill>
-              </a14:hiddenFill>
-            </a:ext>
-          </a:extLst>
-        </p:spPr>
-      </p:pic>
-      <p:pic>
-        <p:nvPicPr>
-          <p:cNvPr id="409" name="Picture 17" descr="E:\guion 11\imagenes mapa 11\7.gif"/>
-          <p:cNvPicPr>
-            <a:picLocks noChangeAspect="1" noChangeArrowheads="1"/>
-          </p:cNvPicPr>
-          <p:nvPr/>
-        </p:nvPicPr>
-        <p:blipFill>
-          <a:blip r:embed="rId9" cstate="print">
-            <a:extLst>
-              <a:ext uri="{28A0092B-C50C-407E-A947-70E740481C1C}">
-                <a14:useLocalDpi xmlns:a14="http://schemas.microsoft.com/office/drawing/2010/main" val="0"/>
-              </a:ext>
-            </a:extLst>
-          </a:blip>
-          <a:srcRect/>
-          <a:stretch>
-            <a:fillRect/>
-          </a:stretch>
-        </p:blipFill>
-        <p:spPr bwMode="auto">
-          <a:xfrm>
-            <a:off x="7335370" y="8594698"/>
-            <a:ext cx="1045704" cy="743901"/>
-          </a:xfrm>
-          <a:prstGeom prst="rect">
-            <a:avLst/>
-          </a:prstGeom>
-          <a:noFill/>
-          <a:extLst>
-            <a:ext uri="{909E8E84-426E-40DD-AFC4-6F175D3DCCD1}">
-              <a14:hiddenFill xmlns:a14="http://schemas.microsoft.com/office/drawing/2010/main">
-                <a:solidFill>
-                  <a:srgbClr val="FFFFFF"/>
-                </a:solidFill>
-              </a14:hiddenFill>
-            </a:ext>
-          </a:extLst>
-        </p:spPr>
-      </p:pic>
-      <p:cxnSp>
-        <p:nvCxnSpPr>
-          <p:cNvPr id="414" name="413 Conector recto"/>
-          <p:cNvCxnSpPr>
-            <a:stCxn id="377" idx="2"/>
-            <a:endCxn id="398" idx="0"/>
-          </p:cNvCxnSpPr>
-          <p:nvPr/>
-        </p:nvCxnSpPr>
-        <p:spPr>
-          <a:xfrm flipH="1">
-            <a:off x="1788168" y="8333103"/>
-            <a:ext cx="3" cy="126692"/>
-          </a:xfrm>
-          <a:prstGeom prst="line">
-            <a:avLst/>
-          </a:prstGeom>
-          <a:ln w="12700">
-            <a:solidFill>
-              <a:schemeClr val="tx1"/>
-            </a:solidFill>
-          </a:ln>
-        </p:spPr>
-        <p:style>
-          <a:lnRef idx="1">
-            <a:schemeClr val="accent1"/>
-          </a:lnRef>
-          <a:fillRef idx="0">
-            <a:schemeClr val="accent1"/>
-          </a:fillRef>
-          <a:effectRef idx="0">
-            <a:schemeClr val="accent1"/>
-          </a:effectRef>
-          <a:fontRef idx="minor">
-            <a:schemeClr val="tx1"/>
-          </a:fontRef>
-        </p:style>
-      </p:cxnSp>
-      <p:sp>
-        <p:nvSpPr>
-          <p:cNvPr id="416" name="Rectángulo 35"/>
-          <p:cNvSpPr/>
-          <p:nvPr/>
-        </p:nvSpPr>
-        <p:spPr>
-          <a:xfrm>
-            <a:off x="4914900" y="6765794"/>
-            <a:ext cx="895350" cy="282707"/>
-          </a:xfrm>
-          <a:prstGeom prst="rect">
-            <a:avLst/>
-          </a:prstGeom>
-          <a:ln>
-            <a:noFill/>
-          </a:ln>
-        </p:spPr>
-        <p:style>
-          <a:lnRef idx="2">
-            <a:schemeClr val="dk1"/>
-          </a:lnRef>
-          <a:fillRef idx="1">
-            <a:schemeClr val="lt1"/>
-          </a:fillRef>
-          <a:effectRef idx="0">
-            <a:schemeClr val="dk1"/>
-          </a:effectRef>
-          <a:fontRef idx="minor">
-            <a:schemeClr val="dk1"/>
-          </a:fontRef>
-        </p:style>
-        <p:txBody>
-          <a:bodyPr lIns="105683" tIns="52841" rIns="105683" bIns="52841" rtlCol="0" anchor="ctr"/>
-          <a:lstStyle/>
-          <a:p>
-            <a:pPr algn="ctr"/>
-            <a:r>
-              <a:rPr lang="es-CO" sz="900" dirty="0" smtClean="0">
-                <a:solidFill>
-                  <a:schemeClr val="tx1"/>
-                </a:solidFill>
-                <a:cs typeface="Arial" pitchFamily="34" charset="0"/>
-              </a:rPr>
-              <a:t>es un </a:t>
-            </a:r>
-          </a:p>
-          <a:p>
-            <a:pPr algn="ctr"/>
-            <a:r>
-              <a:rPr lang="es-CO" sz="900" dirty="0" smtClean="0">
-                <a:solidFill>
-                  <a:schemeClr val="tx1"/>
-                </a:solidFill>
-                <a:cs typeface="Arial" pitchFamily="34" charset="0"/>
-              </a:rPr>
-              <a:t>Poliedro    </a:t>
-            </a:r>
           </a:p>
         </p:txBody>
       </p:sp>
@@ -6824,151 +5535,20 @@
                 </a:solidFill>
                 <a:cs typeface="Arial" pitchFamily="34" charset="0"/>
               </a:rPr>
-              <a:t>Delimitado  por   un polígono, caras triangulares y un punto.    </a:t>
+              <a:t>delimitado  </a:t>
+            </a:r>
+            <a:r>
+              <a:rPr lang="es-CO" sz="900" dirty="0" smtClean="0">
+                <a:solidFill>
+                  <a:schemeClr val="tx1"/>
+                </a:solidFill>
+                <a:cs typeface="Arial" pitchFamily="34" charset="0"/>
+              </a:rPr>
+              <a:t>por   un polígono, caras triangulares y un punto.    </a:t>
             </a:r>
           </a:p>
         </p:txBody>
       </p:sp>
-      <p:sp>
-        <p:nvSpPr>
-          <p:cNvPr id="419" name="Rectángulo 35"/>
-          <p:cNvSpPr/>
-          <p:nvPr/>
-        </p:nvSpPr>
-        <p:spPr>
-          <a:xfrm>
-            <a:off x="4928892" y="8120620"/>
-            <a:ext cx="881358" cy="229218"/>
-          </a:xfrm>
-          <a:prstGeom prst="rect">
-            <a:avLst/>
-          </a:prstGeom>
-          <a:ln>
-            <a:noFill/>
-          </a:ln>
-        </p:spPr>
-        <p:style>
-          <a:lnRef idx="2">
-            <a:schemeClr val="dk1"/>
-          </a:lnRef>
-          <a:fillRef idx="1">
-            <a:schemeClr val="lt1"/>
-          </a:fillRef>
-          <a:effectRef idx="0">
-            <a:schemeClr val="dk1"/>
-          </a:effectRef>
-          <a:fontRef idx="minor">
-            <a:schemeClr val="dk1"/>
-          </a:fontRef>
-        </p:style>
-        <p:txBody>
-          <a:bodyPr lIns="105683" tIns="52841" rIns="105683" bIns="52841" rtlCol="0" anchor="ctr"/>
-          <a:lstStyle/>
-          <a:p>
-            <a:pPr algn="ctr"/>
-            <a:r>
-              <a:rPr lang="es-CO" sz="900" dirty="0">
-                <a:solidFill>
-                  <a:schemeClr val="tx1"/>
-                </a:solidFill>
-                <a:cs typeface="Arial" pitchFamily="34" charset="0"/>
-              </a:rPr>
-              <a:t>e</a:t>
-            </a:r>
-            <a:r>
-              <a:rPr lang="es-CO" sz="900" dirty="0" smtClean="0">
-                <a:solidFill>
-                  <a:schemeClr val="tx1"/>
-                </a:solidFill>
-                <a:cs typeface="Arial" pitchFamily="34" charset="0"/>
-              </a:rPr>
-              <a:t>jemplo    </a:t>
-            </a:r>
-            <a:endParaRPr lang="es-CO" sz="900" dirty="0">
-              <a:solidFill>
-                <a:schemeClr val="tx1"/>
-              </a:solidFill>
-              <a:cs typeface="Arial" pitchFamily="34" charset="0"/>
-            </a:endParaRPr>
-          </a:p>
-        </p:txBody>
-      </p:sp>
-      <p:cxnSp>
-        <p:nvCxnSpPr>
-          <p:cNvPr id="420" name="419 Conector recto"/>
-          <p:cNvCxnSpPr>
-            <a:stCxn id="418" idx="2"/>
-            <a:endCxn id="419" idx="0"/>
-          </p:cNvCxnSpPr>
-          <p:nvPr/>
-        </p:nvCxnSpPr>
-        <p:spPr>
-          <a:xfrm>
-            <a:off x="5363135" y="7990257"/>
-            <a:ext cx="6436" cy="130363"/>
-          </a:xfrm>
-          <a:prstGeom prst="line">
-            <a:avLst/>
-          </a:prstGeom>
-          <a:ln w="12700">
-            <a:solidFill>
-              <a:schemeClr val="tx1"/>
-            </a:solidFill>
-          </a:ln>
-        </p:spPr>
-        <p:style>
-          <a:lnRef idx="1">
-            <a:schemeClr val="accent1"/>
-          </a:lnRef>
-          <a:fillRef idx="0">
-            <a:schemeClr val="accent1"/>
-          </a:fillRef>
-          <a:effectRef idx="0">
-            <a:schemeClr val="accent1"/>
-          </a:effectRef>
-          <a:fontRef idx="minor">
-            <a:schemeClr val="tx1"/>
-          </a:fontRef>
-        </p:style>
-      </p:cxnSp>
-      <p:cxnSp>
-        <p:nvCxnSpPr>
-          <p:cNvPr id="421" name="420 Conector recto"/>
-          <p:cNvCxnSpPr>
-            <a:stCxn id="419" idx="2"/>
-            <a:endCxn id="402" idx="0"/>
-          </p:cNvCxnSpPr>
-          <p:nvPr/>
-        </p:nvCxnSpPr>
-        <p:spPr>
-          <a:xfrm flipH="1">
-            <a:off x="5369568" y="8349838"/>
-            <a:ext cx="3" cy="148057"/>
-          </a:xfrm>
-          <a:prstGeom prst="line">
-            <a:avLst/>
-          </a:prstGeom>
-          <a:ln w="12700">
-            <a:solidFill>
-              <a:schemeClr val="tx1"/>
-            </a:solidFill>
-          </a:ln>
-        </p:spPr>
-        <p:style>
-          <a:lnRef idx="1">
-            <a:schemeClr val="accent1"/>
-          </a:lnRef>
-          <a:fillRef idx="0">
-            <a:schemeClr val="accent1"/>
-          </a:fillRef>
-          <a:effectRef idx="0">
-            <a:schemeClr val="accent1"/>
-          </a:effectRef>
-          <a:fontRef idx="minor">
-            <a:schemeClr val="tx1"/>
-          </a:fontRef>
-        </p:style>
-      </p:cxnSp>
       <p:cxnSp>
         <p:nvCxnSpPr>
           <p:cNvPr id="422" name="421 Conector recto"/>
@@ -7063,8 +5643,14 @@
                 </a:solidFill>
                 <a:cs typeface="Arial" pitchFamily="34" charset="0"/>
               </a:rPr>
-              <a:t>figura    </a:t>
-            </a:r>
+              <a:t>sólido   </a:t>
+            </a:r>
+            <a:endParaRPr lang="es-CO" sz="900" dirty="0" smtClean="0">
+              <a:solidFill>
+                <a:schemeClr val="tx1"/>
+              </a:solidFill>
+              <a:cs typeface="Arial" pitchFamily="34" charset="0"/>
+            </a:endParaRPr>
           </a:p>
         </p:txBody>
       </p:sp>
@@ -7144,13 +5730,49 @@
           <a:p>
             <a:pPr algn="ctr"/>
             <a:r>
-              <a:rPr lang="es-CO" sz="900" dirty="0" smtClean="0">
-                <a:solidFill>
-                  <a:schemeClr val="tx1"/>
-                </a:solidFill>
-                <a:cs typeface="Arial" pitchFamily="34" charset="0"/>
-              </a:rPr>
-              <a:t>Delimitado  por 2 circunferencias de diferente tamaño y una superficie curva     </a:t>
+              <a:rPr lang="es-CO" sz="900" dirty="0">
+                <a:solidFill>
+                  <a:schemeClr val="tx1"/>
+                </a:solidFill>
+                <a:cs typeface="Arial" pitchFamily="34" charset="0"/>
+              </a:rPr>
+              <a:t>d</a:t>
+            </a:r>
+            <a:r>
+              <a:rPr lang="es-CO" sz="900" dirty="0" smtClean="0">
+                <a:solidFill>
+                  <a:schemeClr val="tx1"/>
+                </a:solidFill>
+                <a:cs typeface="Arial" pitchFamily="34" charset="0"/>
+              </a:rPr>
+              <a:t>elimitado  </a:t>
+            </a:r>
+            <a:r>
+              <a:rPr lang="es-CO" sz="900" dirty="0" smtClean="0">
+                <a:solidFill>
+                  <a:schemeClr val="tx1"/>
+                </a:solidFill>
+                <a:cs typeface="Arial" pitchFamily="34" charset="0"/>
+              </a:rPr>
+              <a:t>por 2 </a:t>
+            </a:r>
+            <a:r>
+              <a:rPr lang="es-CO" sz="900" dirty="0" smtClean="0">
+                <a:solidFill>
+                  <a:schemeClr val="tx1"/>
+                </a:solidFill>
+                <a:cs typeface="Arial" pitchFamily="34" charset="0"/>
+              </a:rPr>
+              <a:t>circunferencias paralelas </a:t>
+            </a:r>
+            <a:r>
+              <a:rPr lang="es-CO" sz="900" dirty="0" smtClean="0">
+                <a:solidFill>
+                  <a:schemeClr val="tx1"/>
+                </a:solidFill>
+                <a:cs typeface="Arial" pitchFamily="34" charset="0"/>
+              </a:rPr>
+              <a:t>de diferente tamaño y una superficie curva     </a:t>
             </a:r>
           </a:p>
         </p:txBody>
@@ -7195,14 +5817,14 @@
       </p:cxnSp>
       <p:sp>
         <p:nvSpPr>
-          <p:cNvPr id="427" name="Rectángulo 35"/>
+          <p:cNvPr id="433" name="Rectángulo 35"/>
           <p:cNvSpPr/>
           <p:nvPr/>
         </p:nvSpPr>
         <p:spPr>
           <a:xfrm>
-            <a:off x="6139039" y="8120620"/>
-            <a:ext cx="881358" cy="229218"/>
+            <a:off x="7372350" y="6794369"/>
+            <a:ext cx="895350" cy="282707"/>
           </a:xfrm>
           <a:prstGeom prst="rect">
             <a:avLst/>
@@ -7231,166 +5853,41 @@
           <a:p>
             <a:pPr algn="ctr"/>
             <a:r>
-              <a:rPr lang="es-CO" sz="900" dirty="0">
-                <a:solidFill>
-                  <a:schemeClr val="tx1"/>
-                </a:solidFill>
-                <a:cs typeface="Arial" pitchFamily="34" charset="0"/>
-              </a:rPr>
-              <a:t>e</a:t>
-            </a:r>
-            <a:r>
-              <a:rPr lang="es-CO" sz="900" dirty="0" smtClean="0">
-                <a:solidFill>
-                  <a:schemeClr val="tx1"/>
-                </a:solidFill>
-                <a:cs typeface="Arial" pitchFamily="34" charset="0"/>
-              </a:rPr>
-              <a:t>jemplo    </a:t>
-            </a:r>
-            <a:endParaRPr lang="es-CO" sz="900" dirty="0">
+              <a:rPr lang="es-CO" sz="900" dirty="0" smtClean="0">
+                <a:solidFill>
+                  <a:schemeClr val="tx1"/>
+                </a:solidFill>
+                <a:cs typeface="Arial" pitchFamily="34" charset="0"/>
+              </a:rPr>
+              <a:t>es un </a:t>
+            </a:r>
+          </a:p>
+          <a:p>
+            <a:pPr algn="ctr"/>
+            <a:r>
+              <a:rPr lang="es-CO" sz="900" dirty="0" smtClean="0">
+                <a:solidFill>
+                  <a:schemeClr val="tx1"/>
+                </a:solidFill>
+                <a:cs typeface="Arial" pitchFamily="34" charset="0"/>
+              </a:rPr>
+              <a:t>sólido</a:t>
+            </a:r>
+            <a:r>
+              <a:rPr lang="es-CO" sz="900" dirty="0" smtClean="0">
+                <a:solidFill>
+                  <a:schemeClr val="tx1"/>
+                </a:solidFill>
+                <a:cs typeface="Arial" pitchFamily="34" charset="0"/>
+              </a:rPr>
+              <a:t>   </a:t>
+            </a:r>
+            <a:endParaRPr lang="es-CO" sz="900" dirty="0" smtClean="0">
               <a:solidFill>
                 <a:schemeClr val="tx1"/>
               </a:solidFill>
               <a:cs typeface="Arial" pitchFamily="34" charset="0"/>
             </a:endParaRPr>
-          </a:p>
-        </p:txBody>
-      </p:sp>
-      <p:cxnSp>
-        <p:nvCxnSpPr>
-          <p:cNvPr id="428" name="427 Conector recto"/>
-          <p:cNvCxnSpPr>
-            <a:stCxn id="425" idx="2"/>
-            <a:endCxn id="427" idx="0"/>
-          </p:cNvCxnSpPr>
-          <p:nvPr/>
-        </p:nvCxnSpPr>
-        <p:spPr>
-          <a:xfrm>
-            <a:off x="6573282" y="7980732"/>
-            <a:ext cx="6436" cy="139888"/>
-          </a:xfrm>
-          <a:prstGeom prst="line">
-            <a:avLst/>
-          </a:prstGeom>
-          <a:ln w="12700">
-            <a:solidFill>
-              <a:schemeClr val="tx1"/>
-            </a:solidFill>
-          </a:ln>
-        </p:spPr>
-        <p:style>
-          <a:lnRef idx="1">
-            <a:schemeClr val="accent1"/>
-          </a:lnRef>
-          <a:fillRef idx="0">
-            <a:schemeClr val="accent1"/>
-          </a:fillRef>
-          <a:effectRef idx="0">
-            <a:schemeClr val="accent1"/>
-          </a:effectRef>
-          <a:fontRef idx="minor">
-            <a:schemeClr val="tx1"/>
-          </a:fontRef>
-        </p:style>
-      </p:cxnSp>
-      <p:cxnSp>
-        <p:nvCxnSpPr>
-          <p:cNvPr id="429" name="428 Conector recto"/>
-          <p:cNvCxnSpPr>
-            <a:stCxn id="427" idx="2"/>
-            <a:endCxn id="405" idx="0"/>
-          </p:cNvCxnSpPr>
-          <p:nvPr/>
-        </p:nvCxnSpPr>
-        <p:spPr>
-          <a:xfrm>
-            <a:off x="6579718" y="8349838"/>
-            <a:ext cx="9522" cy="138532"/>
-          </a:xfrm>
-          <a:prstGeom prst="line">
-            <a:avLst/>
-          </a:prstGeom>
-          <a:ln w="12700">
-            <a:solidFill>
-              <a:schemeClr val="tx1"/>
-            </a:solidFill>
-          </a:ln>
-        </p:spPr>
-        <p:style>
-          <a:lnRef idx="1">
-            <a:schemeClr val="accent1"/>
-          </a:lnRef>
-          <a:fillRef idx="0">
-            <a:schemeClr val="accent1"/>
-          </a:fillRef>
-          <a:effectRef idx="0">
-            <a:schemeClr val="accent1"/>
-          </a:effectRef>
-          <a:fontRef idx="minor">
-            <a:schemeClr val="tx1"/>
-          </a:fontRef>
-        </p:style>
-      </p:cxnSp>
-      <p:sp>
-        <p:nvSpPr>
-          <p:cNvPr id="433" name="Rectángulo 35"/>
-          <p:cNvSpPr/>
-          <p:nvPr/>
-        </p:nvSpPr>
-        <p:spPr>
-          <a:xfrm>
-            <a:off x="7372350" y="6794369"/>
-            <a:ext cx="895350" cy="282707"/>
-          </a:xfrm>
-          <a:prstGeom prst="rect">
-            <a:avLst/>
-          </a:prstGeom>
-          <a:ln>
-            <a:noFill/>
-          </a:ln>
-        </p:spPr>
-        <p:style>
-          <a:lnRef idx="2">
-            <a:schemeClr val="dk1"/>
-          </a:lnRef>
-          <a:fillRef idx="1">
-            <a:schemeClr val="lt1"/>
-          </a:fillRef>
-          <a:effectRef idx="0">
-            <a:schemeClr val="dk1"/>
-          </a:effectRef>
-          <a:fontRef idx="minor">
-            <a:schemeClr val="dk1"/>
-          </a:fontRef>
-        </p:style>
-        <p:txBody>
-          <a:bodyPr lIns="105683" tIns="52841" rIns="105683" bIns="52841" rtlCol="0" anchor="ctr"/>
-          <a:lstStyle/>
-          <a:p>
-            <a:pPr algn="ctr"/>
-            <a:r>
-              <a:rPr lang="es-CO" sz="900" dirty="0" smtClean="0">
-                <a:solidFill>
-                  <a:schemeClr val="tx1"/>
-                </a:solidFill>
-                <a:cs typeface="Arial" pitchFamily="34" charset="0"/>
-              </a:rPr>
-              <a:t>es un </a:t>
-            </a:r>
-          </a:p>
-          <a:p>
-            <a:pPr algn="ctr"/>
-            <a:r>
-              <a:rPr lang="es-CO" sz="900" dirty="0" smtClean="0">
-                <a:solidFill>
-                  <a:schemeClr val="tx1"/>
-                </a:solidFill>
-                <a:cs typeface="Arial" pitchFamily="34" charset="0"/>
-              </a:rPr>
-              <a:t>figura    </a:t>
-            </a:r>
           </a:p>
         </p:txBody>
       </p:sp>
@@ -7476,26 +5973,32 @@
                 </a:solidFill>
                 <a:cs typeface="Arial" pitchFamily="34" charset="0"/>
               </a:rPr>
-              <a:t>Delimitado  por dos polígonos semejantes  paralelos  y n paralelogramos </a:t>
-            </a:r>
-            <a:r>
-              <a:rPr lang="es-CO" sz="900" dirty="0" err="1" smtClean="0">
-                <a:solidFill>
-                  <a:schemeClr val="tx1"/>
-                </a:solidFill>
-                <a:cs typeface="Arial" pitchFamily="34" charset="0"/>
-              </a:rPr>
-              <a:t>cingrunetes</a:t>
-            </a:r>
-            <a:r>
-              <a:rPr lang="es-CO" sz="900" dirty="0" smtClean="0">
-                <a:solidFill>
-                  <a:schemeClr val="tx1"/>
-                </a:solidFill>
-                <a:cs typeface="Arial" pitchFamily="34" charset="0"/>
-              </a:rPr>
-              <a:t>    </a:t>
-            </a:r>
+              <a:t>delimitado  </a:t>
+            </a:r>
+            <a:r>
+              <a:rPr lang="es-CO" sz="900" dirty="0" smtClean="0">
+                <a:solidFill>
+                  <a:schemeClr val="tx1"/>
+                </a:solidFill>
+                <a:cs typeface="Arial" pitchFamily="34" charset="0"/>
+              </a:rPr>
+              <a:t>por dos polígonos semejantes  paralelos  y n paralelogramos </a:t>
+            </a:r>
+            <a:r>
+              <a:rPr lang="es-CO" sz="900" dirty="0" smtClean="0">
+                <a:solidFill>
+                  <a:schemeClr val="tx1"/>
+                </a:solidFill>
+                <a:cs typeface="Arial" pitchFamily="34" charset="0"/>
+              </a:rPr>
+              <a:t>congruentes    </a:t>
+            </a:r>
+            <a:endParaRPr lang="es-CO" sz="900" dirty="0" smtClean="0">
+              <a:solidFill>
+                <a:schemeClr val="tx1"/>
+              </a:solidFill>
+              <a:cs typeface="Arial" pitchFamily="34" charset="0"/>
+            </a:endParaRPr>
           </a:p>
         </p:txBody>
       </p:sp>
@@ -7539,146 +6042,6 @@
       </p:cxnSp>
       <p:sp>
         <p:nvSpPr>
-          <p:cNvPr id="442" name="Rectángulo 35"/>
-          <p:cNvSpPr/>
-          <p:nvPr/>
-        </p:nvSpPr>
-        <p:spPr>
-          <a:xfrm>
-            <a:off x="7387286" y="8149195"/>
-            <a:ext cx="881358" cy="229218"/>
-          </a:xfrm>
-          <a:prstGeom prst="rect">
-            <a:avLst/>
-          </a:prstGeom>
-          <a:ln>
-            <a:noFill/>
-          </a:ln>
-        </p:spPr>
-        <p:style>
-          <a:lnRef idx="2">
-            <a:schemeClr val="dk1"/>
-          </a:lnRef>
-          <a:fillRef idx="1">
-            <a:schemeClr val="lt1"/>
-          </a:fillRef>
-          <a:effectRef idx="0">
-            <a:schemeClr val="dk1"/>
-          </a:effectRef>
-          <a:fontRef idx="minor">
-            <a:schemeClr val="dk1"/>
-          </a:fontRef>
-        </p:style>
-        <p:txBody>
-          <a:bodyPr lIns="105683" tIns="52841" rIns="105683" bIns="52841" rtlCol="0" anchor="ctr"/>
-          <a:lstStyle/>
-          <a:p>
-            <a:pPr algn="ctr"/>
-            <a:r>
-              <a:rPr lang="es-CO" sz="900" dirty="0">
-                <a:solidFill>
-                  <a:schemeClr val="tx1"/>
-                </a:solidFill>
-                <a:cs typeface="Arial" pitchFamily="34" charset="0"/>
-              </a:rPr>
-              <a:t>e</a:t>
-            </a:r>
-            <a:r>
-              <a:rPr lang="es-CO" sz="900" dirty="0" smtClean="0">
-                <a:solidFill>
-                  <a:schemeClr val="tx1"/>
-                </a:solidFill>
-                <a:cs typeface="Arial" pitchFamily="34" charset="0"/>
-              </a:rPr>
-              <a:t>jemplo    </a:t>
-            </a:r>
-            <a:endParaRPr lang="es-CO" sz="900" dirty="0">
-              <a:solidFill>
-                <a:schemeClr val="tx1"/>
-              </a:solidFill>
-              <a:cs typeface="Arial" pitchFamily="34" charset="0"/>
-            </a:endParaRPr>
-          </a:p>
-        </p:txBody>
-      </p:sp>
-      <p:cxnSp>
-        <p:nvCxnSpPr>
-          <p:cNvPr id="443" name="442 Conector recto"/>
-          <p:cNvCxnSpPr>
-            <a:stCxn id="442" idx="2"/>
-            <a:endCxn id="407" idx="0"/>
-          </p:cNvCxnSpPr>
-          <p:nvPr/>
-        </p:nvCxnSpPr>
-        <p:spPr>
-          <a:xfrm>
-            <a:off x="7827965" y="8378413"/>
-            <a:ext cx="9522" cy="129007"/>
-          </a:xfrm>
-          <a:prstGeom prst="line">
-            <a:avLst/>
-          </a:prstGeom>
-          <a:ln w="12700">
-            <a:solidFill>
-              <a:schemeClr val="tx1"/>
-            </a:solidFill>
-          </a:ln>
-        </p:spPr>
-        <p:style>
-          <a:lnRef idx="1">
-            <a:schemeClr val="accent1"/>
-          </a:lnRef>
-          <a:fillRef idx="0">
-            <a:schemeClr val="accent1"/>
-          </a:fillRef>
-          <a:effectRef idx="0">
-            <a:schemeClr val="accent1"/>
-          </a:effectRef>
-          <a:fontRef idx="minor">
-            <a:schemeClr val="tx1"/>
-          </a:fontRef>
-        </p:style>
-      </p:cxnSp>
-      <p:cxnSp>
-        <p:nvCxnSpPr>
-          <p:cNvPr id="444" name="443 Conector recto"/>
-          <p:cNvCxnSpPr>
-            <a:stCxn id="437" idx="2"/>
-            <a:endCxn id="442" idx="0"/>
-          </p:cNvCxnSpPr>
-          <p:nvPr/>
-        </p:nvCxnSpPr>
-        <p:spPr>
-          <a:xfrm>
-            <a:off x="7821529" y="7992308"/>
-            <a:ext cx="6436" cy="156887"/>
-          </a:xfrm>
-          <a:prstGeom prst="line">
-            <a:avLst/>
-          </a:prstGeom>
-          <a:ln w="12700">
-            <a:solidFill>
-              <a:schemeClr val="tx1"/>
-            </a:solidFill>
-          </a:ln>
-        </p:spPr>
-        <p:style>
-          <a:lnRef idx="1">
-            <a:schemeClr val="accent1"/>
-          </a:lnRef>
-          <a:fillRef idx="0">
-            <a:schemeClr val="accent1"/>
-          </a:fillRef>
-          <a:effectRef idx="0">
-            <a:schemeClr val="accent1"/>
-          </a:effectRef>
-          <a:fontRef idx="minor">
-            <a:schemeClr val="tx1"/>
-          </a:fontRef>
-        </p:style>
-      </p:cxnSp>
-      <p:sp>
-        <p:nvSpPr>
           <p:cNvPr id="450" name="Rectángulo 35"/>
           <p:cNvSpPr/>
           <p:nvPr/>
@@ -7993,16 +6356,7 @@
                 </a:solidFill>
                 <a:cs typeface="Arial" pitchFamily="34" charset="0"/>
               </a:rPr>
-              <a:t>e forman </a:t>
-            </a:r>
-            <a:r>
-              <a:rPr lang="es-CO" sz="900" dirty="0" smtClean="0">
-                <a:solidFill>
-                  <a:schemeClr val="tx1"/>
-                </a:solidFill>
-                <a:cs typeface="Arial" pitchFamily="34" charset="0"/>
-              </a:rPr>
-              <a:t>    </a:t>
+              <a:t>e forman     </a:t>
             </a:r>
             <a:endParaRPr lang="es-CO" sz="900" dirty="0">
               <a:solidFill>
@@ -8104,16 +6458,7 @@
                 </a:solidFill>
                 <a:cs typeface="Arial" pitchFamily="34" charset="0"/>
               </a:rPr>
-              <a:t>l resultado es </a:t>
-            </a:r>
-            <a:r>
-              <a:rPr lang="es-CO" sz="900" dirty="0" smtClean="0">
-                <a:solidFill>
-                  <a:schemeClr val="tx1"/>
-                </a:solidFill>
-                <a:cs typeface="Arial" pitchFamily="34" charset="0"/>
-              </a:rPr>
-              <a:t>     </a:t>
+              <a:t>l resultado es      </a:t>
             </a:r>
             <a:endParaRPr lang="es-CO" sz="900" dirty="0">
               <a:solidFill>
@@ -8253,16 +6598,25 @@
                 </a:solidFill>
                 <a:cs typeface="Arial" pitchFamily="34" charset="0"/>
               </a:rPr>
-              <a:t>apa que representa todo la tierra</a:t>
-            </a:r>
-            <a:r>
-              <a:rPr lang="es-CO" sz="900" dirty="0" smtClean="0">
-                <a:solidFill>
-                  <a:schemeClr val="tx1"/>
-                </a:solidFill>
-                <a:cs typeface="Arial" pitchFamily="34" charset="0"/>
-              </a:rPr>
-              <a:t> </a:t>
+              <a:t>apa que representa </a:t>
+            </a:r>
+            <a:r>
+              <a:rPr lang="es-CO" sz="900" dirty="0" smtClean="0">
+                <a:solidFill>
+                  <a:schemeClr val="tx1"/>
+                </a:solidFill>
+                <a:cs typeface="Arial" pitchFamily="34" charset="0"/>
+              </a:rPr>
+              <a:t>toda </a:t>
+            </a:r>
+            <a:r>
+              <a:rPr lang="es-CO" sz="900" dirty="0" smtClean="0">
+                <a:solidFill>
+                  <a:schemeClr val="tx1"/>
+                </a:solidFill>
+                <a:cs typeface="Arial" pitchFamily="34" charset="0"/>
+              </a:rPr>
+              <a:t>la tierra </a:t>
             </a:r>
             <a:endParaRPr lang="es-CO" sz="900" dirty="0">
               <a:solidFill>
@@ -8419,16 +6773,7 @@
                 </a:solidFill>
                 <a:cs typeface="Arial" pitchFamily="34" charset="0"/>
               </a:rPr>
-              <a:t>e forman </a:t>
-            </a:r>
-            <a:r>
-              <a:rPr lang="es-CO" sz="900" dirty="0" smtClean="0">
-                <a:solidFill>
-                  <a:schemeClr val="tx1"/>
-                </a:solidFill>
-                <a:cs typeface="Arial" pitchFamily="34" charset="0"/>
-              </a:rPr>
-              <a:t>    </a:t>
+              <a:t>e forman     </a:t>
             </a:r>
             <a:endParaRPr lang="es-CO" sz="900" dirty="0">
               <a:solidFill>
@@ -8530,16 +6875,7 @@
                 </a:solidFill>
                 <a:cs typeface="Arial" pitchFamily="34" charset="0"/>
               </a:rPr>
-              <a:t>l resultado es </a:t>
-            </a:r>
-            <a:r>
-              <a:rPr lang="es-CO" sz="900" dirty="0" smtClean="0">
-                <a:solidFill>
-                  <a:schemeClr val="tx1"/>
-                </a:solidFill>
-                <a:cs typeface="Arial" pitchFamily="34" charset="0"/>
-              </a:rPr>
-              <a:t>     </a:t>
+              <a:t>l resultado es      </a:t>
             </a:r>
             <a:endParaRPr lang="es-CO" sz="900" dirty="0">
               <a:solidFill>
@@ -8679,16 +7015,7 @@
                 </a:solidFill>
                 <a:cs typeface="Arial" pitchFamily="34" charset="0"/>
               </a:rPr>
-              <a:t>apa que representa una  parte de la tierra</a:t>
-            </a:r>
-            <a:r>
-              <a:rPr lang="es-CO" sz="900" dirty="0" smtClean="0">
-                <a:solidFill>
-                  <a:schemeClr val="tx1"/>
-                </a:solidFill>
-                <a:cs typeface="Arial" pitchFamily="34" charset="0"/>
-              </a:rPr>
-              <a:t> </a:t>
+              <a:t>apa que representa una  parte de la tierra </a:t>
             </a:r>
             <a:endParaRPr lang="es-CO" sz="900" dirty="0">
               <a:solidFill>
@@ -8845,16 +7172,7 @@
                 </a:solidFill>
                 <a:cs typeface="Arial" pitchFamily="34" charset="0"/>
               </a:rPr>
-              <a:t>e forman </a:t>
-            </a:r>
-            <a:r>
-              <a:rPr lang="es-CO" sz="900" dirty="0" smtClean="0">
-                <a:solidFill>
-                  <a:schemeClr val="tx1"/>
-                </a:solidFill>
-                <a:cs typeface="Arial" pitchFamily="34" charset="0"/>
-              </a:rPr>
-              <a:t>    </a:t>
+              <a:t>e forman     </a:t>
             </a:r>
             <a:endParaRPr lang="es-CO" sz="900" dirty="0">
               <a:solidFill>
@@ -8955,16 +7273,7 @@
                 </a:solidFill>
                 <a:cs typeface="Arial" pitchFamily="34" charset="0"/>
               </a:rPr>
-              <a:t>l resultado es </a:t>
-            </a:r>
-            <a:r>
-              <a:rPr lang="es-CO" sz="900" dirty="0" smtClean="0">
-                <a:solidFill>
-                  <a:schemeClr val="tx1"/>
-                </a:solidFill>
-                <a:cs typeface="Arial" pitchFamily="34" charset="0"/>
-              </a:rPr>
-              <a:t>     </a:t>
+              <a:t>l resultado es      </a:t>
             </a:r>
             <a:endParaRPr lang="es-CO" sz="900" dirty="0">
               <a:solidFill>
@@ -9104,16 +7413,7 @@
                 </a:solidFill>
                 <a:cs typeface="Arial" pitchFamily="34" charset="0"/>
               </a:rPr>
-              <a:t>apa que representa una parte de la tierra</a:t>
-            </a:r>
-            <a:r>
-              <a:rPr lang="es-CO" sz="900" dirty="0" smtClean="0">
-                <a:solidFill>
-                  <a:schemeClr val="tx1"/>
-                </a:solidFill>
-                <a:cs typeface="Arial" pitchFamily="34" charset="0"/>
-              </a:rPr>
-              <a:t> </a:t>
+              <a:t>apa que representa una parte de la tierra </a:t>
             </a:r>
             <a:endParaRPr lang="es-CO" sz="900" dirty="0">
               <a:solidFill>

</xml_diff>